<commit_message>
[REPORT3] add ex_ADtree & opti
</commit_message>
<xml_diff>
--- a/soutenances/projet_decembre/spec.pptx
+++ b/soutenances/projet_decembre/spec.pptx
@@ -6,6 +6,7 @@
   </p:sldMasterIdLst>
   <p:sldIdLst>
     <p:sldId id="259" r:id="rId2"/>
+    <p:sldId id="260" r:id="rId3"/>
   </p:sldIdLst>
   <p:sldSz cx="9144000" cy="6858000" type="screen4x3"/>
   <p:notesSz cx="6858000" cy="9144000"/>
@@ -106,13 +107,28 @@
   </p:defaultTextStyle>
   <p:extLst>
     <p:ext uri="{521415D9-36F7-43E2-AB2F-B90AF26B5E84}">
-      <p14:sectionLst xmlns:p14="http://schemas.microsoft.com/office/powerpoint/2010/main" xmlns="">
+      <p14:sectionLst xmlns:p14="http://schemas.microsoft.com/office/powerpoint/2010/main">
         <p14:section name="Modèles INSA" id="{339B715A-A4F6-482F-9E8F-E995A152AF53}">
           <p14:sldIdLst>
-            <p14:sldId id="256"/>
+            <p14:sldId id="259"/>
+            <p14:sldId id="260"/>
           </p14:sldIdLst>
         </p14:section>
       </p14:sectionLst>
+    </p:ext>
+    <p:ext uri="{EFAFB233-063F-42B5-8137-9DF3F51BA10A}">
+      <p15:sldGuideLst xmlns:p15="http://schemas.microsoft.com/office/powerpoint/2012/main">
+        <p15:guide id="1" orient="horz" pos="2160">
+          <p15:clr>
+            <a:srgbClr val="A4A3A4"/>
+          </p15:clr>
+        </p15:guide>
+        <p15:guide id="2" pos="2880">
+          <p15:clr>
+            <a:srgbClr val="A4A3A4"/>
+          </p15:clr>
+        </p15:guide>
+      </p15:sldGuideLst>
     </p:ext>
   </p:extLst>
 </p:presentation>
@@ -207,7 +223,7 @@
             <a:blip r:embed="rId2" cstate="print">
               <a:extLst>
                 <a:ext uri="{28A0092B-C50C-407E-A947-70E740481C1C}">
-                  <a14:useLocalDpi xmlns:a14="http://schemas.microsoft.com/office/drawing/2010/main" xmlns="" val="0"/>
+                  <a14:useLocalDpi xmlns:a14="http://schemas.microsoft.com/office/drawing/2010/main" val="0"/>
                 </a:ext>
               </a:extLst>
             </a:blip>
@@ -225,7 +241,7 @@
             <a:noFill/>
             <a:extLst>
               <a:ext uri="{909E8E84-426E-40DD-AFC4-6F175D3DCCD1}">
-                <a14:hiddenFill xmlns:a14="http://schemas.microsoft.com/office/drawing/2010/main" xmlns="">
+                <a14:hiddenFill xmlns:a14="http://schemas.microsoft.com/office/drawing/2010/main">
                   <a:solidFill>
                     <a:srgbClr val="FFFFFF"/>
                   </a:solidFill>
@@ -246,7 +262,7 @@
             <a:blip r:embed="rId3" cstate="print">
               <a:extLst>
                 <a:ext uri="{28A0092B-C50C-407E-A947-70E740481C1C}">
-                  <a14:useLocalDpi xmlns:a14="http://schemas.microsoft.com/office/drawing/2010/main" xmlns="" val="0"/>
+                  <a14:useLocalDpi xmlns:a14="http://schemas.microsoft.com/office/drawing/2010/main" val="0"/>
                 </a:ext>
               </a:extLst>
             </a:blip>
@@ -266,7 +282,7 @@
             <a:noFill/>
             <a:extLst>
               <a:ext uri="{909E8E84-426E-40DD-AFC4-6F175D3DCCD1}">
-                <a14:hiddenFill xmlns:a14="http://schemas.microsoft.com/office/drawing/2010/main" xmlns="">
+                <a14:hiddenFill xmlns:a14="http://schemas.microsoft.com/office/drawing/2010/main">
                   <a:solidFill>
                     <a:srgbClr val="FFFFFF"/>
                   </a:solidFill>
@@ -1315,7 +1331,7 @@
     </p:spTree>
     <p:extLst>
       <p:ext uri="{BB962C8B-B14F-4D97-AF65-F5344CB8AC3E}">
-        <p14:creationId xmlns:p14="http://schemas.microsoft.com/office/powerpoint/2010/main" xmlns="" val="2155599893"/>
+        <p14:creationId xmlns:p14="http://schemas.microsoft.com/office/powerpoint/2010/main" val="2155599893"/>
       </p:ext>
     </p:extLst>
   </p:cSld>
@@ -1473,7 +1489,7 @@
     </p:spTree>
     <p:extLst>
       <p:ext uri="{BB962C8B-B14F-4D97-AF65-F5344CB8AC3E}">
-        <p14:creationId xmlns:p14="http://schemas.microsoft.com/office/powerpoint/2010/main" xmlns="" val="2625538701"/>
+        <p14:creationId xmlns:p14="http://schemas.microsoft.com/office/powerpoint/2010/main" val="2625538701"/>
       </p:ext>
     </p:extLst>
   </p:cSld>
@@ -1701,7 +1717,7 @@
     </p:spTree>
     <p:extLst>
       <p:ext uri="{BB962C8B-B14F-4D97-AF65-F5344CB8AC3E}">
-        <p14:creationId xmlns:p14="http://schemas.microsoft.com/office/powerpoint/2010/main" xmlns="" val="1505370761"/>
+        <p14:creationId xmlns:p14="http://schemas.microsoft.com/office/powerpoint/2010/main" val="1505370761"/>
       </p:ext>
     </p:extLst>
   </p:cSld>
@@ -1947,7 +1963,7 @@
     </p:spTree>
     <p:extLst>
       <p:ext uri="{BB962C8B-B14F-4D97-AF65-F5344CB8AC3E}">
-        <p14:creationId xmlns:p14="http://schemas.microsoft.com/office/powerpoint/2010/main" xmlns="" val="1601618539"/>
+        <p14:creationId xmlns:p14="http://schemas.microsoft.com/office/powerpoint/2010/main" val="1601618539"/>
       </p:ext>
     </p:extLst>
   </p:cSld>
@@ -2331,7 +2347,7 @@
     </p:spTree>
     <p:extLst>
       <p:ext uri="{BB962C8B-B14F-4D97-AF65-F5344CB8AC3E}">
-        <p14:creationId xmlns:p14="http://schemas.microsoft.com/office/powerpoint/2010/main" xmlns="" val="171255179"/>
+        <p14:creationId xmlns:p14="http://schemas.microsoft.com/office/powerpoint/2010/main" val="171255179"/>
       </p:ext>
     </p:extLst>
   </p:cSld>
@@ -2433,7 +2449,7 @@
     </p:spTree>
     <p:extLst>
       <p:ext uri="{BB962C8B-B14F-4D97-AF65-F5344CB8AC3E}">
-        <p14:creationId xmlns:p14="http://schemas.microsoft.com/office/powerpoint/2010/main" xmlns="" val="4241946124"/>
+        <p14:creationId xmlns:p14="http://schemas.microsoft.com/office/powerpoint/2010/main" val="4241946124"/>
       </p:ext>
     </p:extLst>
   </p:cSld>
@@ -2471,7 +2487,7 @@
     </p:spTree>
     <p:extLst>
       <p:ext uri="{BB962C8B-B14F-4D97-AF65-F5344CB8AC3E}">
-        <p14:creationId xmlns:p14="http://schemas.microsoft.com/office/powerpoint/2010/main" xmlns="" val="3843733788"/>
+        <p14:creationId xmlns:p14="http://schemas.microsoft.com/office/powerpoint/2010/main" val="3843733788"/>
       </p:ext>
     </p:extLst>
   </p:cSld>
@@ -2767,7 +2783,7 @@
     </p:spTree>
     <p:extLst>
       <p:ext uri="{BB962C8B-B14F-4D97-AF65-F5344CB8AC3E}">
-        <p14:creationId xmlns:p14="http://schemas.microsoft.com/office/powerpoint/2010/main" xmlns="" val="680884878"/>
+        <p14:creationId xmlns:p14="http://schemas.microsoft.com/office/powerpoint/2010/main" val="680884878"/>
       </p:ext>
     </p:extLst>
   </p:cSld>
@@ -3816,7 +3832,7 @@
           <a:blip r:embed="rId10" cstate="print">
             <a:extLst>
               <a:ext uri="{28A0092B-C50C-407E-A947-70E740481C1C}">
-                <a14:useLocalDpi xmlns:a14="http://schemas.microsoft.com/office/drawing/2010/main" xmlns="" val="0"/>
+                <a14:useLocalDpi xmlns:a14="http://schemas.microsoft.com/office/drawing/2010/main" val="0"/>
               </a:ext>
             </a:extLst>
           </a:blip>
@@ -3834,7 +3850,7 @@
           <a:noFill/>
           <a:extLst>
             <a:ext uri="{909E8E84-426E-40DD-AFC4-6F175D3DCCD1}">
-              <a14:hiddenFill xmlns:a14="http://schemas.microsoft.com/office/drawing/2010/main" xmlns="">
+              <a14:hiddenFill xmlns:a14="http://schemas.microsoft.com/office/drawing/2010/main">
                 <a:solidFill>
                   <a:srgbClr val="FFFFFF"/>
                 </a:solidFill>
@@ -3855,7 +3871,7 @@
           <a:blip r:embed="rId11" cstate="print">
             <a:extLst>
               <a:ext uri="{28A0092B-C50C-407E-A947-70E740481C1C}">
-                <a14:useLocalDpi xmlns:a14="http://schemas.microsoft.com/office/drawing/2010/main" xmlns="" val="0"/>
+                <a14:useLocalDpi xmlns:a14="http://schemas.microsoft.com/office/drawing/2010/main" val="0"/>
               </a:ext>
             </a:extLst>
           </a:blip>
@@ -3875,7 +3891,7 @@
           <a:noFill/>
           <a:extLst>
             <a:ext uri="{909E8E84-426E-40DD-AFC4-6F175D3DCCD1}">
-              <a14:hiddenFill xmlns:a14="http://schemas.microsoft.com/office/drawing/2010/main" xmlns="">
+              <a14:hiddenFill xmlns:a14="http://schemas.microsoft.com/office/drawing/2010/main">
                 <a:solidFill>
                   <a:srgbClr val="FFFFFF"/>
                 </a:solidFill>
@@ -4033,7 +4049,7 @@
             <a:lum bright="70000" contrast="-70000"/>
             <a:extLst>
               <a:ext uri="{28A0092B-C50C-407E-A947-70E740481C1C}">
-                <a14:useLocalDpi xmlns:a14="http://schemas.microsoft.com/office/drawing/2010/main" xmlns="" val="0"/>
+                <a14:useLocalDpi xmlns:a14="http://schemas.microsoft.com/office/drawing/2010/main" val="0"/>
               </a:ext>
             </a:extLst>
           </a:blip>
@@ -4054,7 +4070,7 @@
     </p:spTree>
     <p:extLst>
       <p:ext uri="{BB962C8B-B14F-4D97-AF65-F5344CB8AC3E}">
-        <p14:creationId xmlns:p14="http://schemas.microsoft.com/office/powerpoint/2010/main" xmlns="" val="3080300347"/>
+        <p14:creationId xmlns:p14="http://schemas.microsoft.com/office/powerpoint/2010/main" val="3080300347"/>
       </p:ext>
     </p:extLst>
   </p:cSld>
@@ -4366,10 +4382,10 @@
           <a:lstStyle/>
           <a:p>
             <a:r>
-              <a:rPr lang="fr-FR" smtClean="0"/>
-              <a:t>Plan</a:t>
-            </a:r>
-            <a:endParaRPr lang="fr-FR"/>
+              <a:rPr lang="fr-FR" dirty="0" smtClean="0"/>
+              <a:t>L’optimiseur</a:t>
+            </a:r>
+            <a:endParaRPr lang="fr-FR" dirty="0"/>
           </a:p>
         </p:txBody>
       </p:sp>
@@ -4388,114 +4404,25 @@
           <a:bodyPr/>
           <a:lstStyle/>
           <a:p>
-            <a:r>
-              <a:rPr lang="fr-FR" smtClean="0"/>
-              <a:t>Intro </a:t>
-            </a:r>
-            <a:r>
-              <a:rPr lang="fr-FR" smtClean="0">
-                <a:sym typeface="Wingdings" pitchFamily="2" charset="2"/>
-              </a:rPr>
-              <a:t> Valou</a:t>
-            </a:r>
-            <a:endParaRPr lang="fr-FR" smtClean="0"/>
-          </a:p>
-          <a:p>
-            <a:endParaRPr lang="fr-FR" smtClean="0"/>
-          </a:p>
-          <a:p>
-            <a:r>
-              <a:rPr lang="fr-FR" smtClean="0"/>
-              <a:t>Etat de l’art  </a:t>
-            </a:r>
-            <a:r>
-              <a:rPr lang="fr-FR" smtClean="0">
-                <a:sym typeface="Wingdings" pitchFamily="2" charset="2"/>
-              </a:rPr>
-              <a:t> FloBière</a:t>
-            </a:r>
-            <a:endParaRPr lang="fr-FR" smtClean="0"/>
-          </a:p>
-          <a:p>
-            <a:endParaRPr lang="fr-FR" smtClean="0"/>
-          </a:p>
-          <a:p>
-            <a:r>
-              <a:rPr lang="fr-FR" smtClean="0"/>
-              <a:t>Etude de l’existant </a:t>
-            </a:r>
-            <a:r>
-              <a:rPr lang="fr-FR" smtClean="0"/>
-              <a:t> </a:t>
-            </a:r>
-            <a:r>
-              <a:rPr lang="fr-FR" smtClean="0">
-                <a:sym typeface="Wingdings" pitchFamily="2" charset="2"/>
-              </a:rPr>
-              <a:t> Maud</a:t>
-            </a:r>
-            <a:endParaRPr lang="fr-FR" smtClean="0"/>
-          </a:p>
-          <a:p>
-            <a:endParaRPr lang="fr-FR" smtClean="0"/>
-          </a:p>
-          <a:p>
-            <a:r>
-              <a:rPr lang="fr-FR" smtClean="0"/>
-              <a:t>Glasir : cahier des </a:t>
-            </a:r>
-            <a:r>
-              <a:rPr lang="fr-FR" smtClean="0"/>
-              <a:t>charges	</a:t>
-            </a:r>
-            <a:r>
-              <a:rPr lang="fr-FR" smtClean="0">
-                <a:sym typeface="Wingdings" pitchFamily="2" charset="2"/>
-              </a:rPr>
-              <a:t> Hoel</a:t>
-            </a:r>
-            <a:endParaRPr lang="fr-FR" smtClean="0"/>
-          </a:p>
-          <a:p>
-            <a:r>
-              <a:rPr lang="fr-FR" smtClean="0"/>
-              <a:t>Architecture globale</a:t>
-            </a:r>
-          </a:p>
-          <a:p>
-            <a:endParaRPr lang="fr-FR" smtClean="0"/>
-          </a:p>
-          <a:p>
-            <a:r>
-              <a:rPr lang="fr-FR" smtClean="0"/>
-              <a:t>Spéc 	</a:t>
-            </a:r>
-            <a:r>
-              <a:rPr lang="fr-FR" smtClean="0">
-                <a:sym typeface="Wingdings" pitchFamily="2" charset="2"/>
-              </a:rPr>
-              <a:t> </a:t>
-            </a:r>
-            <a:r>
-              <a:rPr lang="fr-FR" smtClean="0"/>
-              <a:t>Coco</a:t>
-            </a:r>
-          </a:p>
-          <a:p>
-            <a:endParaRPr lang="fr-FR" smtClean="0"/>
-          </a:p>
-          <a:p>
-            <a:r>
-              <a:rPr lang="fr-FR" smtClean="0"/>
-              <a:t>Plannif conclusion </a:t>
-            </a:r>
-            <a:r>
-              <a:rPr lang="fr-FR" smtClean="0">
-                <a:sym typeface="Wingdings" pitchFamily="2" charset="2"/>
-              </a:rPr>
-              <a:t> PM</a:t>
-            </a:r>
-            <a:endParaRPr lang="fr-FR" smtClean="0"/>
+            <a:endParaRPr lang="fr-FR" dirty="0"/>
+          </a:p>
+          <a:p>
+            <a:endParaRPr lang="fr-FR" dirty="0" smtClean="0"/>
+          </a:p>
+          <a:p>
+            <a:endParaRPr lang="fr-FR" dirty="0" smtClean="0"/>
+          </a:p>
+          <a:p>
+            <a:endParaRPr lang="fr-FR" dirty="0"/>
+          </a:p>
+          <a:p>
+            <a:endParaRPr lang="fr-FR" dirty="0" smtClean="0"/>
+          </a:p>
+          <a:p>
+            <a:endParaRPr lang="fr-FR" dirty="0"/>
+          </a:p>
+          <a:p>
+            <a:endParaRPr lang="fr-FR" dirty="0" smtClean="0"/>
           </a:p>
         </p:txBody>
       </p:sp>
@@ -4516,10 +4443,52 @@
           </a:bodyPr>
           <a:lstStyle/>
           <a:p>
-            <a:endParaRPr lang="fr-FR"/>
+            <a:r>
+              <a:rPr lang="fr-FR" dirty="0" smtClean="0"/>
+              <a:t>Spécifications </a:t>
+            </a:r>
+            <a:r>
+              <a:rPr lang="fr-FR" dirty="0" err="1" smtClean="0"/>
+              <a:t>Fonctionelles</a:t>
+            </a:r>
+            <a:r>
+              <a:rPr lang="fr-FR" dirty="0" smtClean="0"/>
+              <a:t>.</a:t>
+            </a:r>
+            <a:endParaRPr lang="fr-FR" dirty="0"/>
           </a:p>
         </p:txBody>
       </p:sp>
+      <p:pic>
+        <p:nvPicPr>
+          <p:cNvPr id="7" name="Image 6"/>
+          <p:cNvPicPr>
+            <a:picLocks noChangeAspect="1"/>
+          </p:cNvPicPr>
+          <p:nvPr/>
+        </p:nvPicPr>
+        <p:blipFill>
+          <a:blip r:embed="rId2">
+            <a:extLst>
+              <a:ext uri="{28A0092B-C50C-407E-A947-70E740481C1C}">
+                <a14:useLocalDpi xmlns:a14="http://schemas.microsoft.com/office/drawing/2010/main" val="0"/>
+              </a:ext>
+            </a:extLst>
+          </a:blip>
+          <a:stretch>
+            <a:fillRect/>
+          </a:stretch>
+        </p:blipFill>
+        <p:spPr>
+          <a:xfrm>
+            <a:off x="298376" y="1460115"/>
+            <a:ext cx="8388424" cy="4441826"/>
+          </a:xfrm>
+          <a:prstGeom prst="rect">
+            <a:avLst/>
+          </a:prstGeom>
+        </p:spPr>
+      </p:pic>
     </p:spTree>
   </p:cSld>
   <p:clrMapOvr>
@@ -4532,6 +4501,95 @@
       </p:par>
     </p:tnLst>
   </p:timing>
+</p:sld>
+</file>
+
+<file path=ppt/slides/slide2.xml><?xml version="1.0" encoding="utf-8"?>
+<p:sld xmlns:a="http://schemas.openxmlformats.org/drawingml/2006/main" xmlns:r="http://schemas.openxmlformats.org/officeDocument/2006/relationships" xmlns:p="http://schemas.openxmlformats.org/presentationml/2006/main">
+  <p:cSld>
+    <p:spTree>
+      <p:nvGrpSpPr>
+        <p:cNvPr id="1" name=""/>
+        <p:cNvGrpSpPr/>
+        <p:nvPr/>
+      </p:nvGrpSpPr>
+      <p:grpSpPr>
+        <a:xfrm>
+          <a:off x="0" y="0"/>
+          <a:ext cx="0" cy="0"/>
+          <a:chOff x="0" y="0"/>
+          <a:chExt cx="0" cy="0"/>
+        </a:xfrm>
+      </p:grpSpPr>
+      <p:sp>
+        <p:nvSpPr>
+          <p:cNvPr id="2" name="Titre 1"/>
+          <p:cNvSpPr>
+            <a:spLocks noGrp="1"/>
+          </p:cNvSpPr>
+          <p:nvPr>
+            <p:ph type="title"/>
+          </p:nvPr>
+        </p:nvSpPr>
+        <p:spPr/>
+        <p:txBody>
+          <a:bodyPr/>
+          <a:lstStyle/>
+          <a:p>
+            <a:endParaRPr lang="fr-FR"/>
+          </a:p>
+        </p:txBody>
+      </p:sp>
+      <p:sp>
+        <p:nvSpPr>
+          <p:cNvPr id="3" name="Espace réservé du contenu 2"/>
+          <p:cNvSpPr>
+            <a:spLocks noGrp="1"/>
+          </p:cNvSpPr>
+          <p:nvPr>
+            <p:ph idx="1"/>
+          </p:nvPr>
+        </p:nvSpPr>
+        <p:spPr/>
+        <p:txBody>
+          <a:bodyPr/>
+          <a:lstStyle/>
+          <a:p>
+            <a:endParaRPr lang="fr-FR" dirty="0"/>
+          </a:p>
+        </p:txBody>
+      </p:sp>
+      <p:sp>
+        <p:nvSpPr>
+          <p:cNvPr id="4" name="Espace réservé du texte 3"/>
+          <p:cNvSpPr>
+            <a:spLocks noGrp="1"/>
+          </p:cNvSpPr>
+          <p:nvPr>
+            <p:ph type="body" sz="quarter" idx="10"/>
+          </p:nvPr>
+        </p:nvSpPr>
+        <p:spPr/>
+        <p:txBody>
+          <a:bodyPr>
+            <a:normAutofit fontScale="92500" lnSpcReduction="20000"/>
+          </a:bodyPr>
+          <a:lstStyle/>
+          <a:p>
+            <a:endParaRPr lang="fr-FR"/>
+          </a:p>
+        </p:txBody>
+      </p:sp>
+    </p:spTree>
+    <p:extLst>
+      <p:ext uri="{BB962C8B-B14F-4D97-AF65-F5344CB8AC3E}">
+        <p14:creationId xmlns:p14="http://schemas.microsoft.com/office/powerpoint/2010/main" val="1433429"/>
+      </p:ext>
+    </p:extLst>
+  </p:cSld>
+  <p:clrMapOvr>
+    <a:masterClrMapping/>
+  </p:clrMapOvr>
 </p:sld>
 </file>
 

</xml_diff>

<commit_message>
[soutenance] fin v1 diapo spec
</commit_message>
<xml_diff>
--- a/soutenances/projet_decembre/spec.pptx
+++ b/soutenances/projet_decembre/spec.pptx
@@ -5,13 +5,18 @@
     <p:sldMasterId id="2147483654" r:id="rId1"/>
   </p:sldMasterIdLst>
   <p:notesMasterIdLst>
-    <p:notesMasterId r:id="rId6"/>
+    <p:notesMasterId r:id="rId11"/>
   </p:notesMasterIdLst>
   <p:sldIdLst>
-    <p:sldId id="259" r:id="rId2"/>
-    <p:sldId id="260" r:id="rId3"/>
-    <p:sldId id="263" r:id="rId4"/>
-    <p:sldId id="262" r:id="rId5"/>
+    <p:sldId id="262" r:id="rId2"/>
+    <p:sldId id="264" r:id="rId3"/>
+    <p:sldId id="259" r:id="rId4"/>
+    <p:sldId id="265" r:id="rId5"/>
+    <p:sldId id="266" r:id="rId6"/>
+    <p:sldId id="260" r:id="rId7"/>
+    <p:sldId id="263" r:id="rId8"/>
+    <p:sldId id="267" r:id="rId9"/>
+    <p:sldId id="268" r:id="rId10"/>
   </p:sldIdLst>
   <p:sldSz cx="9144000" cy="6858000" type="screen4x3"/>
   <p:notesSz cx="6858000" cy="9144000"/>
@@ -115,10 +120,15 @@
       <p14:sectionLst xmlns:p14="http://schemas.microsoft.com/office/powerpoint/2010/main">
         <p14:section name="Modèles INSA" id="{339B715A-A4F6-482F-9E8F-E995A152AF53}">
           <p14:sldIdLst>
+            <p14:sldId id="262"/>
+            <p14:sldId id="264"/>
             <p14:sldId id="259"/>
+            <p14:sldId id="265"/>
+            <p14:sldId id="266"/>
             <p14:sldId id="260"/>
             <p14:sldId id="263"/>
-            <p14:sldId id="262"/>
+            <p14:sldId id="267"/>
+            <p14:sldId id="268"/>
           </p14:sldIdLst>
         </p14:section>
       </p14:sectionLst>
@@ -556,7 +566,7 @@
           <a:p>
             <a:fld id="{AB9270AC-FE6D-4237-9CBB-95A5B25BC716}" type="slidenum">
               <a:rPr lang="fr-FR" smtClean="0"/>
-              <a:t>2</a:t>
+              <a:t>6</a:t>
             </a:fld>
             <a:endParaRPr lang="fr-FR"/>
           </a:p>
@@ -640,7 +650,7 @@
           <a:p>
             <a:fld id="{AB9270AC-FE6D-4237-9CBB-95A5B25BC716}" type="slidenum">
               <a:rPr lang="fr-FR" smtClean="0"/>
-              <a:t>3</a:t>
+              <a:t>7</a:t>
             </a:fld>
             <a:endParaRPr lang="fr-FR"/>
           </a:p>
@@ -4903,55 +4913,16 @@
         </p:nvSpPr>
         <p:spPr/>
         <p:txBody>
-          <a:bodyPr/>
+          <a:bodyPr>
+            <a:normAutofit/>
+          </a:bodyPr>
           <a:lstStyle/>
           <a:p>
             <a:r>
-              <a:rPr lang="fr-FR" dirty="0"/>
-              <a:t>O</a:t>
-            </a:r>
-            <a:r>
               <a:rPr lang="fr-FR" dirty="0" smtClean="0"/>
-              <a:t>ptimiseur</a:t>
+              <a:t>Paramètre de synthèse</a:t>
             </a:r>
             <a:endParaRPr lang="fr-FR" dirty="0"/>
-          </a:p>
-        </p:txBody>
-      </p:sp>
-      <p:sp>
-        <p:nvSpPr>
-          <p:cNvPr id="3" name="Espace réservé du contenu 2"/>
-          <p:cNvSpPr>
-            <a:spLocks noGrp="1"/>
-          </p:cNvSpPr>
-          <p:nvPr>
-            <p:ph idx="1"/>
-          </p:nvPr>
-        </p:nvSpPr>
-        <p:spPr/>
-        <p:txBody>
-          <a:bodyPr/>
-          <a:lstStyle/>
-          <a:p>
-            <a:endParaRPr lang="fr-FR" dirty="0"/>
-          </a:p>
-          <a:p>
-            <a:endParaRPr lang="fr-FR" dirty="0" smtClean="0"/>
-          </a:p>
-          <a:p>
-            <a:endParaRPr lang="fr-FR" dirty="0" smtClean="0"/>
-          </a:p>
-          <a:p>
-            <a:endParaRPr lang="fr-FR" dirty="0"/>
-          </a:p>
-          <a:p>
-            <a:endParaRPr lang="fr-FR" dirty="0" smtClean="0"/>
-          </a:p>
-          <a:p>
-            <a:endParaRPr lang="fr-FR" dirty="0"/>
-          </a:p>
-          <a:p>
-            <a:endParaRPr lang="fr-FR" dirty="0" smtClean="0"/>
           </a:p>
         </p:txBody>
       </p:sp>
@@ -4973,16 +4944,519 @@
           <a:lstStyle/>
           <a:p>
             <a:r>
+              <a:rPr lang="fr-FR" dirty="0"/>
+              <a:t>Spécifications fonctionnelles.</a:t>
+            </a:r>
+            <a:endParaRPr lang="fr-FR" dirty="0"/>
+          </a:p>
+        </p:txBody>
+      </p:sp>
+      <p:pic>
+        <p:nvPicPr>
+          <p:cNvPr id="3" name="Espace réservé du contenu 2"/>
+          <p:cNvPicPr>
+            <a:picLocks noGrp="1" noChangeAspect="1"/>
+          </p:cNvPicPr>
+          <p:nvPr>
+            <p:ph idx="1"/>
+          </p:nvPr>
+        </p:nvPicPr>
+        <p:blipFill>
+          <a:blip r:embed="rId2" cstate="print">
+            <a:extLst>
+              <a:ext uri="{28A0092B-C50C-407E-A947-70E740481C1C}">
+                <a14:useLocalDpi xmlns:a14="http://schemas.microsoft.com/office/drawing/2010/main" val="0"/>
+              </a:ext>
+            </a:extLst>
+          </a:blip>
+          <a:stretch>
+            <a:fillRect/>
+          </a:stretch>
+        </p:blipFill>
+        <p:spPr>
+          <a:xfrm>
+            <a:off x="4510298" y="1545198"/>
+            <a:ext cx="4504637" cy="2638110"/>
+          </a:xfrm>
+        </p:spPr>
+      </p:pic>
+      <p:pic>
+        <p:nvPicPr>
+          <p:cNvPr id="5" name="Image 4"/>
+          <p:cNvPicPr>
+            <a:picLocks noChangeAspect="1"/>
+          </p:cNvPicPr>
+          <p:nvPr/>
+        </p:nvPicPr>
+        <p:blipFill rotWithShape="1">
+          <a:blip r:embed="rId3" cstate="print">
+            <a:extLst>
+              <a:ext uri="{28A0092B-C50C-407E-A947-70E740481C1C}">
+                <a14:useLocalDpi xmlns:a14="http://schemas.microsoft.com/office/drawing/2010/main" val="0"/>
+              </a:ext>
+            </a:extLst>
+          </a:blip>
+          <a:srcRect r="5380"/>
+          <a:stretch/>
+        </p:blipFill>
+        <p:spPr>
+          <a:xfrm>
+            <a:off x="1" y="1616219"/>
+            <a:ext cx="4572000" cy="2676877"/>
+          </a:xfrm>
+          <a:prstGeom prst="rect">
+            <a:avLst/>
+          </a:prstGeom>
+        </p:spPr>
+      </p:pic>
+      <p:sp>
+        <p:nvSpPr>
+          <p:cNvPr id="7" name="ZoneTexte 6"/>
+          <p:cNvSpPr txBox="1"/>
+          <p:nvPr/>
+        </p:nvSpPr>
+        <p:spPr>
+          <a:xfrm>
+            <a:off x="395536" y="4509120"/>
+            <a:ext cx="3816424" cy="646331"/>
+          </a:xfrm>
+          <a:prstGeom prst="rect">
+            <a:avLst/>
+          </a:prstGeom>
+          <a:noFill/>
+        </p:spPr>
+        <p:txBody>
+          <a:bodyPr wrap="square" rtlCol="0">
+            <a:spAutoFit/>
+          </a:bodyPr>
+          <a:lstStyle/>
+          <a:p>
+            <a:pPr algn="ctr"/>
+            <a:r>
               <a:rPr lang="fr-FR" dirty="0" smtClean="0"/>
-              <a:t>Spécifications </a:t>
+              <a:t>Arbre </a:t>
+            </a:r>
+            <a:r>
+              <a:rPr lang="fr-FR" dirty="0" err="1" smtClean="0"/>
+              <a:t>valué</a:t>
             </a:r>
             <a:r>
               <a:rPr lang="fr-FR" dirty="0" smtClean="0"/>
-              <a:t>fonctionnelles</a:t>
-            </a:r>
+              <a:t> selon le cout minimum pour l’attaquant</a:t>
+            </a:r>
+            <a:endParaRPr lang="fr-FR" dirty="0"/>
+          </a:p>
+        </p:txBody>
+      </p:sp>
+      <p:sp>
+        <p:nvSpPr>
+          <p:cNvPr id="8" name="ZoneTexte 7"/>
+          <p:cNvSpPr txBox="1"/>
+          <p:nvPr/>
+        </p:nvSpPr>
+        <p:spPr>
+          <a:xfrm>
+            <a:off x="4716016" y="4509119"/>
+            <a:ext cx="3954812" cy="646331"/>
+          </a:xfrm>
+          <a:prstGeom prst="rect">
+            <a:avLst/>
+          </a:prstGeom>
+          <a:noFill/>
+        </p:spPr>
+        <p:txBody>
+          <a:bodyPr wrap="square" rtlCol="0">
+            <a:spAutoFit/>
+          </a:bodyPr>
+          <a:lstStyle/>
+          <a:p>
+            <a:pPr algn="ctr"/>
             <a:r>
               <a:rPr lang="fr-FR" dirty="0" smtClean="0"/>
-              <a:t>.</a:t>
+              <a:t>Arbre </a:t>
+            </a:r>
+            <a:r>
+              <a:rPr lang="fr-FR" dirty="0" err="1" smtClean="0"/>
+              <a:t>valué</a:t>
+            </a:r>
+            <a:r>
+              <a:rPr lang="fr-FR" dirty="0" smtClean="0"/>
+              <a:t> selon le temps minimum pour l’attaquant</a:t>
+            </a:r>
+            <a:endParaRPr lang="fr-FR" dirty="0"/>
+          </a:p>
+        </p:txBody>
+      </p:sp>
+    </p:spTree>
+    <p:extLst>
+      <p:ext uri="{BB962C8B-B14F-4D97-AF65-F5344CB8AC3E}">
+        <p14:creationId xmlns:p14="http://schemas.microsoft.com/office/powerpoint/2010/main" val="4013023658"/>
+      </p:ext>
+    </p:extLst>
+  </p:cSld>
+  <p:clrMapOvr>
+    <a:masterClrMapping/>
+  </p:clrMapOvr>
+  <p:timing>
+    <p:tnLst>
+      <p:par>
+        <p:cTn id="1" dur="indefinite" restart="never" nodeType="tmRoot"/>
+      </p:par>
+    </p:tnLst>
+  </p:timing>
+</p:sld>
+</file>
+
+<file path=ppt/slides/slide2.xml><?xml version="1.0" encoding="utf-8"?>
+<p:sld xmlns:a="http://schemas.openxmlformats.org/drawingml/2006/main" xmlns:r="http://schemas.openxmlformats.org/officeDocument/2006/relationships" xmlns:p="http://schemas.openxmlformats.org/presentationml/2006/main">
+  <p:cSld>
+    <p:spTree>
+      <p:nvGrpSpPr>
+        <p:cNvPr id="1" name=""/>
+        <p:cNvGrpSpPr/>
+        <p:nvPr/>
+      </p:nvGrpSpPr>
+      <p:grpSpPr>
+        <a:xfrm>
+          <a:off x="0" y="0"/>
+          <a:ext cx="0" cy="0"/>
+          <a:chOff x="0" y="0"/>
+          <a:chExt cx="0" cy="0"/>
+        </a:xfrm>
+      </p:grpSpPr>
+      <p:sp>
+        <p:nvSpPr>
+          <p:cNvPr id="2" name="Titre 1"/>
+          <p:cNvSpPr>
+            <a:spLocks noGrp="1"/>
+          </p:cNvSpPr>
+          <p:nvPr>
+            <p:ph type="title"/>
+          </p:nvPr>
+        </p:nvSpPr>
+        <p:spPr/>
+        <p:txBody>
+          <a:bodyPr/>
+          <a:lstStyle/>
+          <a:p>
+            <a:r>
+              <a:rPr lang="fr-FR" dirty="0" smtClean="0"/>
+              <a:t>Paramètre de synthèse</a:t>
+            </a:r>
+            <a:endParaRPr lang="fr-FR" dirty="0"/>
+          </a:p>
+        </p:txBody>
+      </p:sp>
+      <p:sp>
+        <p:nvSpPr>
+          <p:cNvPr id="3" name="Espace réservé du contenu 2"/>
+          <p:cNvSpPr>
+            <a:spLocks noGrp="1"/>
+          </p:cNvSpPr>
+          <p:nvPr>
+            <p:ph idx="1"/>
+          </p:nvPr>
+        </p:nvSpPr>
+        <p:spPr/>
+        <p:txBody>
+          <a:bodyPr/>
+          <a:lstStyle/>
+          <a:p>
+            <a:r>
+              <a:rPr lang="fr-FR" dirty="0" smtClean="0"/>
+              <a:t>Définition d’un paramètre de synthèse.</a:t>
+            </a:r>
+          </a:p>
+          <a:p>
+            <a:endParaRPr lang="fr-FR" dirty="0"/>
+          </a:p>
+          <a:p>
+            <a:endParaRPr lang="fr-FR" dirty="0" smtClean="0"/>
+          </a:p>
+          <a:p>
+            <a:endParaRPr lang="fr-FR" dirty="0" smtClean="0"/>
+          </a:p>
+        </p:txBody>
+      </p:sp>
+      <p:sp>
+        <p:nvSpPr>
+          <p:cNvPr id="4" name="Espace réservé du texte 3"/>
+          <p:cNvSpPr>
+            <a:spLocks noGrp="1"/>
+          </p:cNvSpPr>
+          <p:nvPr>
+            <p:ph type="body" sz="quarter" idx="10"/>
+          </p:nvPr>
+        </p:nvSpPr>
+        <p:spPr/>
+        <p:txBody>
+          <a:bodyPr>
+            <a:normAutofit fontScale="92500" lnSpcReduction="20000"/>
+          </a:bodyPr>
+          <a:lstStyle/>
+          <a:p>
+            <a:r>
+              <a:rPr lang="fr-FR" dirty="0"/>
+              <a:t>Spécifications fonctionnelles.</a:t>
+            </a:r>
+            <a:endParaRPr lang="fr-FR" dirty="0"/>
+          </a:p>
+        </p:txBody>
+      </p:sp>
+      <mc:AlternateContent xmlns:mc="http://schemas.openxmlformats.org/markup-compatibility/2006">
+        <mc:Choice xmlns:a14="http://schemas.microsoft.com/office/drawing/2010/main" Requires="a14">
+          <p:sp>
+            <p:nvSpPr>
+              <p:cNvPr id="5" name="ZoneTexte 4"/>
+              <p:cNvSpPr txBox="1"/>
+              <p:nvPr/>
+            </p:nvSpPr>
+            <p:spPr>
+              <a:xfrm>
+                <a:off x="1979712" y="1572366"/>
+                <a:ext cx="4752528" cy="553998"/>
+              </a:xfrm>
+              <a:prstGeom prst="rect">
+                <a:avLst/>
+              </a:prstGeom>
+              <a:noFill/>
+            </p:spPr>
+            <p:txBody>
+              <a:bodyPr wrap="square" lIns="0" tIns="0" rIns="0" bIns="0" rtlCol="0">
+                <a:spAutoFit/>
+              </a:bodyPr>
+              <a:lstStyle/>
+              <a:p>
+                <a14:m>
+                  <m:oMathPara xmlns:m="http://schemas.openxmlformats.org/officeDocument/2006/math">
+                    <m:oMathParaPr>
+                      <m:jc m:val="centerGroup"/>
+                    </m:oMathParaPr>
+                    <m:oMath xmlns:m="http://schemas.openxmlformats.org/officeDocument/2006/math">
+                      <m:r>
+                        <a:rPr lang="fr-FR" sz="3600" b="0" i="1" smtClean="0">
+                          <a:latin typeface="Cambria Math" panose="02040503050406030204" pitchFamily="18" charset="0"/>
+                        </a:rPr>
+                        <m:t>𝑟𝑒𝑠</m:t>
+                      </m:r>
+                      <m:r>
+                        <a:rPr lang="fr-FR" sz="3600" b="0" i="1" smtClean="0">
+                          <a:latin typeface="Cambria Math" panose="02040503050406030204" pitchFamily="18" charset="0"/>
+                        </a:rPr>
+                        <m:t>=</m:t>
+                      </m:r>
+                      <m:r>
+                        <a:rPr lang="fr-FR" sz="3600" b="0" i="1" smtClean="0">
+                          <a:latin typeface="Cambria Math" panose="02040503050406030204" pitchFamily="18" charset="0"/>
+                        </a:rPr>
+                        <m:t>𝑐𝑜𝑠𝑡</m:t>
+                      </m:r>
+                      <m:r>
+                        <a:rPr lang="fr-FR" sz="3600" b="0" i="1" smtClean="0">
+                          <a:latin typeface="Cambria Math" panose="02040503050406030204" pitchFamily="18" charset="0"/>
+                        </a:rPr>
+                        <m:t> ∗</m:t>
+                      </m:r>
+                      <m:r>
+                        <a:rPr lang="fr-FR" sz="3600" b="0" i="1" smtClean="0">
+                          <a:latin typeface="Cambria Math" panose="02040503050406030204" pitchFamily="18" charset="0"/>
+                        </a:rPr>
+                        <m:t>𝑡𝑖𝑚𝑒</m:t>
+                      </m:r>
+                    </m:oMath>
+                  </m:oMathPara>
+                </a14:m>
+                <a:endParaRPr lang="fr-FR" sz="3600" dirty="0"/>
+              </a:p>
+            </p:txBody>
+          </p:sp>
+        </mc:Choice>
+        <mc:Fallback>
+          <p:sp>
+            <p:nvSpPr>
+              <p:cNvPr id="5" name="ZoneTexte 4"/>
+              <p:cNvSpPr txBox="1">
+                <a:spLocks noRot="1" noChangeAspect="1" noMove="1" noResize="1" noEditPoints="1" noAdjustHandles="1" noChangeArrowheads="1" noChangeShapeType="1" noTextEdit="1"/>
+              </p:cNvSpPr>
+              <p:nvPr/>
+            </p:nvSpPr>
+            <p:spPr>
+              <a:xfrm>
+                <a:off x="1979712" y="1572366"/>
+                <a:ext cx="4752528" cy="553998"/>
+              </a:xfrm>
+              <a:prstGeom prst="rect">
+                <a:avLst/>
+              </a:prstGeom>
+              <a:blipFill rotWithShape="0">
+                <a:blip r:embed="rId2"/>
+                <a:stretch>
+                  <a:fillRect/>
+                </a:stretch>
+              </a:blipFill>
+            </p:spPr>
+            <p:txBody>
+              <a:bodyPr/>
+              <a:lstStyle/>
+              <a:p>
+                <a:r>
+                  <a:rPr lang="fr-FR">
+                    <a:noFill/>
+                  </a:rPr>
+                  <a:t> </a:t>
+                </a:r>
+              </a:p>
+            </p:txBody>
+          </p:sp>
+        </mc:Fallback>
+      </mc:AlternateContent>
+      <p:pic>
+        <p:nvPicPr>
+          <p:cNvPr id="6" name="Image 5"/>
+          <p:cNvPicPr>
+            <a:picLocks noChangeAspect="1"/>
+          </p:cNvPicPr>
+          <p:nvPr/>
+        </p:nvPicPr>
+        <p:blipFill>
+          <a:blip r:embed="rId3" cstate="print">
+            <a:extLst>
+              <a:ext uri="{28A0092B-C50C-407E-A947-70E740481C1C}">
+                <a14:useLocalDpi xmlns:a14="http://schemas.microsoft.com/office/drawing/2010/main" val="0"/>
+              </a:ext>
+            </a:extLst>
+          </a:blip>
+          <a:stretch>
+            <a:fillRect/>
+          </a:stretch>
+        </p:blipFill>
+        <p:spPr>
+          <a:xfrm>
+            <a:off x="1628936" y="2567359"/>
+            <a:ext cx="5886127" cy="3444982"/>
+          </a:xfrm>
+          <a:prstGeom prst="rect">
+            <a:avLst/>
+          </a:prstGeom>
+        </p:spPr>
+      </p:pic>
+    </p:spTree>
+    <p:extLst>
+      <p:ext uri="{BB962C8B-B14F-4D97-AF65-F5344CB8AC3E}">
+        <p14:creationId xmlns:p14="http://schemas.microsoft.com/office/powerpoint/2010/main" val="3755762842"/>
+      </p:ext>
+    </p:extLst>
+  </p:cSld>
+  <p:clrMapOvr>
+    <a:masterClrMapping/>
+  </p:clrMapOvr>
+  <p:timing>
+    <p:tnLst>
+      <p:par>
+        <p:cTn id="1" dur="indefinite" restart="never" nodeType="tmRoot"/>
+      </p:par>
+    </p:tnLst>
+  </p:timing>
+</p:sld>
+</file>
+
+<file path=ppt/slides/slide3.xml><?xml version="1.0" encoding="utf-8"?>
+<p:sld xmlns:a="http://schemas.openxmlformats.org/drawingml/2006/main" xmlns:r="http://schemas.openxmlformats.org/officeDocument/2006/relationships" xmlns:p="http://schemas.openxmlformats.org/presentationml/2006/main">
+  <p:cSld>
+    <p:spTree>
+      <p:nvGrpSpPr>
+        <p:cNvPr id="1" name=""/>
+        <p:cNvGrpSpPr/>
+        <p:nvPr/>
+      </p:nvGrpSpPr>
+      <p:grpSpPr>
+        <a:xfrm>
+          <a:off x="0" y="0"/>
+          <a:ext cx="0" cy="0"/>
+          <a:chOff x="0" y="0"/>
+          <a:chExt cx="0" cy="0"/>
+        </a:xfrm>
+      </p:grpSpPr>
+      <p:sp>
+        <p:nvSpPr>
+          <p:cNvPr id="2" name="Titre 1"/>
+          <p:cNvSpPr>
+            <a:spLocks noGrp="1"/>
+          </p:cNvSpPr>
+          <p:nvPr>
+            <p:ph type="title"/>
+          </p:nvPr>
+        </p:nvSpPr>
+        <p:spPr/>
+        <p:txBody>
+          <a:bodyPr/>
+          <a:lstStyle/>
+          <a:p>
+            <a:r>
+              <a:rPr lang="fr-FR" dirty="0" smtClean="0"/>
+              <a:t>Filtre</a:t>
+            </a:r>
+            <a:endParaRPr lang="fr-FR" dirty="0"/>
+          </a:p>
+        </p:txBody>
+      </p:sp>
+      <p:sp>
+        <p:nvSpPr>
+          <p:cNvPr id="3" name="Espace réservé du contenu 2"/>
+          <p:cNvSpPr>
+            <a:spLocks noGrp="1"/>
+          </p:cNvSpPr>
+          <p:nvPr>
+            <p:ph idx="1"/>
+          </p:nvPr>
+        </p:nvSpPr>
+        <p:spPr/>
+        <p:txBody>
+          <a:bodyPr/>
+          <a:lstStyle/>
+          <a:p>
+            <a:endParaRPr lang="fr-FR" dirty="0"/>
+          </a:p>
+          <a:p>
+            <a:endParaRPr lang="fr-FR" dirty="0" smtClean="0"/>
+          </a:p>
+          <a:p>
+            <a:endParaRPr lang="fr-FR" dirty="0" smtClean="0"/>
+          </a:p>
+          <a:p>
+            <a:endParaRPr lang="fr-FR" dirty="0"/>
+          </a:p>
+          <a:p>
+            <a:endParaRPr lang="fr-FR" dirty="0" smtClean="0"/>
+          </a:p>
+          <a:p>
+            <a:endParaRPr lang="fr-FR" dirty="0"/>
+          </a:p>
+          <a:p>
+            <a:endParaRPr lang="fr-FR" dirty="0" smtClean="0"/>
+          </a:p>
+        </p:txBody>
+      </p:sp>
+      <p:sp>
+        <p:nvSpPr>
+          <p:cNvPr id="4" name="Espace réservé du texte 3"/>
+          <p:cNvSpPr>
+            <a:spLocks noGrp="1"/>
+          </p:cNvSpPr>
+          <p:nvPr>
+            <p:ph type="body" sz="quarter" idx="10"/>
+          </p:nvPr>
+        </p:nvSpPr>
+        <p:spPr/>
+        <p:txBody>
+          <a:bodyPr>
+            <a:normAutofit fontScale="92500" lnSpcReduction="20000"/>
+          </a:bodyPr>
+          <a:lstStyle/>
+          <a:p>
+            <a:r>
+              <a:rPr lang="fr-FR" dirty="0" smtClean="0"/>
+              <a:t>Spécifications fonctionnelles.</a:t>
             </a:r>
             <a:endParaRPr lang="fr-FR" dirty="0"/>
           </a:p>
@@ -5033,7 +5507,411 @@
 </p:sld>
 </file>
 
-<file path=ppt/slides/slide2.xml><?xml version="1.0" encoding="utf-8"?>
+<file path=ppt/slides/slide4.xml><?xml version="1.0" encoding="utf-8"?>
+<p:sld xmlns:a="http://schemas.openxmlformats.org/drawingml/2006/main" xmlns:r="http://schemas.openxmlformats.org/officeDocument/2006/relationships" xmlns:p="http://schemas.openxmlformats.org/presentationml/2006/main">
+  <p:cSld>
+    <p:spTree>
+      <p:nvGrpSpPr>
+        <p:cNvPr id="1" name=""/>
+        <p:cNvGrpSpPr/>
+        <p:nvPr/>
+      </p:nvGrpSpPr>
+      <p:grpSpPr>
+        <a:xfrm>
+          <a:off x="0" y="0"/>
+          <a:ext cx="0" cy="0"/>
+          <a:chOff x="0" y="0"/>
+          <a:chExt cx="0" cy="0"/>
+        </a:xfrm>
+      </p:grpSpPr>
+      <p:sp>
+        <p:nvSpPr>
+          <p:cNvPr id="2" name="Titre 1"/>
+          <p:cNvSpPr>
+            <a:spLocks noGrp="1"/>
+          </p:cNvSpPr>
+          <p:nvPr>
+            <p:ph type="title"/>
+          </p:nvPr>
+        </p:nvSpPr>
+        <p:spPr/>
+        <p:txBody>
+          <a:bodyPr/>
+          <a:lstStyle/>
+          <a:p>
+            <a:r>
+              <a:rPr lang="fr-FR" dirty="0" smtClean="0"/>
+              <a:t>Filtre</a:t>
+            </a:r>
+            <a:endParaRPr lang="fr-FR" dirty="0"/>
+          </a:p>
+        </p:txBody>
+      </p:sp>
+      <p:pic>
+        <p:nvPicPr>
+          <p:cNvPr id="5" name="Espace réservé du contenu 4"/>
+          <p:cNvPicPr>
+            <a:picLocks noGrp="1" noChangeAspect="1"/>
+          </p:cNvPicPr>
+          <p:nvPr>
+            <p:ph idx="1"/>
+          </p:nvPr>
+        </p:nvPicPr>
+        <p:blipFill>
+          <a:blip r:embed="rId2" cstate="print">
+            <a:extLst>
+              <a:ext uri="{28A0092B-C50C-407E-A947-70E740481C1C}">
+                <a14:useLocalDpi xmlns:a14="http://schemas.microsoft.com/office/drawing/2010/main" val="0"/>
+              </a:ext>
+            </a:extLst>
+          </a:blip>
+          <a:stretch>
+            <a:fillRect/>
+          </a:stretch>
+        </p:blipFill>
+        <p:spPr>
+          <a:xfrm>
+            <a:off x="179512" y="1268760"/>
+            <a:ext cx="8849415" cy="4373388"/>
+          </a:xfrm>
+        </p:spPr>
+      </p:pic>
+      <p:sp>
+        <p:nvSpPr>
+          <p:cNvPr id="4" name="Espace réservé du texte 3"/>
+          <p:cNvSpPr>
+            <a:spLocks noGrp="1"/>
+          </p:cNvSpPr>
+          <p:nvPr>
+            <p:ph type="body" sz="quarter" idx="10"/>
+          </p:nvPr>
+        </p:nvSpPr>
+        <p:spPr/>
+        <p:txBody>
+          <a:bodyPr>
+            <a:normAutofit fontScale="92500" lnSpcReduction="20000"/>
+          </a:bodyPr>
+          <a:lstStyle/>
+          <a:p>
+            <a:endParaRPr lang="fr-FR"/>
+          </a:p>
+        </p:txBody>
+      </p:sp>
+    </p:spTree>
+    <p:extLst>
+      <p:ext uri="{BB962C8B-B14F-4D97-AF65-F5344CB8AC3E}">
+        <p14:creationId xmlns:p14="http://schemas.microsoft.com/office/powerpoint/2010/main" val="541828603"/>
+      </p:ext>
+    </p:extLst>
+  </p:cSld>
+  <p:clrMapOvr>
+    <a:masterClrMapping/>
+  </p:clrMapOvr>
+  <mc:AlternateContent xmlns:mc="http://schemas.openxmlformats.org/markup-compatibility/2006">
+    <mc:Choice xmlns:p14="http://schemas.microsoft.com/office/powerpoint/2010/main" Requires="p14">
+      <p:transition p14:dur="0"/>
+    </mc:Choice>
+    <mc:Fallback>
+      <p:transition/>
+    </mc:Fallback>
+  </mc:AlternateContent>
+  <p:timing>
+    <p:tnLst>
+      <p:par>
+        <p:cTn id="1" dur="indefinite" restart="never" nodeType="tmRoot"/>
+      </p:par>
+    </p:tnLst>
+  </p:timing>
+</p:sld>
+</file>
+
+<file path=ppt/slides/slide5.xml><?xml version="1.0" encoding="utf-8"?>
+<p:sld xmlns:a="http://schemas.openxmlformats.org/drawingml/2006/main" xmlns:r="http://schemas.openxmlformats.org/officeDocument/2006/relationships" xmlns:p="http://schemas.openxmlformats.org/presentationml/2006/main">
+  <p:cSld>
+    <p:spTree>
+      <p:nvGrpSpPr>
+        <p:cNvPr id="1" name=""/>
+        <p:cNvGrpSpPr/>
+        <p:nvPr/>
+      </p:nvGrpSpPr>
+      <p:grpSpPr>
+        <a:xfrm>
+          <a:off x="0" y="0"/>
+          <a:ext cx="0" cy="0"/>
+          <a:chOff x="0" y="0"/>
+          <a:chExt cx="0" cy="0"/>
+        </a:xfrm>
+      </p:grpSpPr>
+      <p:sp>
+        <p:nvSpPr>
+          <p:cNvPr id="2" name="Titre 1"/>
+          <p:cNvSpPr>
+            <a:spLocks noGrp="1"/>
+          </p:cNvSpPr>
+          <p:nvPr>
+            <p:ph type="title"/>
+          </p:nvPr>
+        </p:nvSpPr>
+        <p:spPr/>
+        <p:txBody>
+          <a:bodyPr/>
+          <a:lstStyle/>
+          <a:p>
+            <a:r>
+              <a:rPr lang="fr-FR" dirty="0" smtClean="0"/>
+              <a:t>Filtre</a:t>
+            </a:r>
+            <a:endParaRPr lang="fr-FR" dirty="0"/>
+          </a:p>
+        </p:txBody>
+      </p:sp>
+      <p:pic>
+        <p:nvPicPr>
+          <p:cNvPr id="5" name="Espace réservé du contenu 4"/>
+          <p:cNvPicPr>
+            <a:picLocks noGrp="1" noChangeAspect="1"/>
+          </p:cNvPicPr>
+          <p:nvPr>
+            <p:ph idx="1"/>
+          </p:nvPr>
+        </p:nvPicPr>
+        <p:blipFill rotWithShape="1">
+          <a:blip r:embed="rId2" cstate="print">
+            <a:extLst>
+              <a:ext uri="{28A0092B-C50C-407E-A947-70E740481C1C}">
+                <a14:useLocalDpi xmlns:a14="http://schemas.microsoft.com/office/drawing/2010/main" val="0"/>
+              </a:ext>
+            </a:extLst>
+          </a:blip>
+          <a:srcRect l="-1" r="8052"/>
+          <a:stretch/>
+        </p:blipFill>
+        <p:spPr>
+          <a:xfrm>
+            <a:off x="179513" y="1268760"/>
+            <a:ext cx="8136903" cy="4373388"/>
+          </a:xfrm>
+        </p:spPr>
+      </p:pic>
+      <p:sp>
+        <p:nvSpPr>
+          <p:cNvPr id="4" name="Espace réservé du texte 3"/>
+          <p:cNvSpPr>
+            <a:spLocks noGrp="1"/>
+          </p:cNvSpPr>
+          <p:nvPr>
+            <p:ph type="body" sz="quarter" idx="10"/>
+          </p:nvPr>
+        </p:nvSpPr>
+        <p:spPr/>
+        <p:txBody>
+          <a:bodyPr>
+            <a:normAutofit fontScale="92500" lnSpcReduction="20000"/>
+          </a:bodyPr>
+          <a:lstStyle/>
+          <a:p>
+            <a:endParaRPr lang="fr-FR"/>
+          </a:p>
+        </p:txBody>
+      </p:sp>
+      <p:pic>
+        <p:nvPicPr>
+          <p:cNvPr id="3" name="Image 2"/>
+          <p:cNvPicPr>
+            <a:picLocks noChangeAspect="1"/>
+          </p:cNvPicPr>
+          <p:nvPr/>
+        </p:nvPicPr>
+        <p:blipFill>
+          <a:blip r:embed="rId3" cstate="print">
+            <a:extLst>
+              <a:ext uri="{28A0092B-C50C-407E-A947-70E740481C1C}">
+                <a14:useLocalDpi xmlns:a14="http://schemas.microsoft.com/office/drawing/2010/main" val="0"/>
+              </a:ext>
+            </a:extLst>
+          </a:blip>
+          <a:stretch>
+            <a:fillRect/>
+          </a:stretch>
+        </p:blipFill>
+        <p:spPr>
+          <a:xfrm>
+            <a:off x="2987824" y="57638"/>
+            <a:ext cx="5954223" cy="6621322"/>
+          </a:xfrm>
+          <a:prstGeom prst="snip1Rect">
+            <a:avLst>
+              <a:gd name="adj" fmla="val 47595"/>
+            </a:avLst>
+          </a:prstGeom>
+        </p:spPr>
+      </p:pic>
+      <p:sp>
+        <p:nvSpPr>
+          <p:cNvPr id="6" name="ZoneTexte 5"/>
+          <p:cNvSpPr txBox="1"/>
+          <p:nvPr/>
+        </p:nvSpPr>
+        <p:spPr>
+          <a:xfrm>
+            <a:off x="1008150" y="1201404"/>
+            <a:ext cx="3384376" cy="923330"/>
+          </a:xfrm>
+          <a:prstGeom prst="rect">
+            <a:avLst/>
+          </a:prstGeom>
+          <a:noFill/>
+        </p:spPr>
+        <p:txBody>
+          <a:bodyPr wrap="square" rtlCol="0">
+            <a:spAutoFit/>
+          </a:bodyPr>
+          <a:lstStyle/>
+          <a:p>
+            <a:r>
+              <a:rPr lang="fr-FR" dirty="0" smtClean="0"/>
+              <a:t>Arbre optimisé pour un </a:t>
+            </a:r>
+            <a:r>
+              <a:rPr lang="fr-FR" dirty="0" smtClean="0"/>
+              <a:t>coup compris  </a:t>
+            </a:r>
+            <a:r>
+              <a:rPr lang="fr-FR" dirty="0" smtClean="0"/>
+              <a:t>dans l’intervalle [0,500]</a:t>
+            </a:r>
+            <a:endParaRPr lang="fr-FR" dirty="0"/>
+          </a:p>
+        </p:txBody>
+      </p:sp>
+    </p:spTree>
+    <p:extLst>
+      <p:ext uri="{BB962C8B-B14F-4D97-AF65-F5344CB8AC3E}">
+        <p14:creationId xmlns:p14="http://schemas.microsoft.com/office/powerpoint/2010/main" val="495475639"/>
+      </p:ext>
+    </p:extLst>
+  </p:cSld>
+  <p:clrMapOvr>
+    <a:masterClrMapping/>
+  </p:clrMapOvr>
+  <mc:AlternateContent xmlns:mc="http://schemas.openxmlformats.org/markup-compatibility/2006">
+    <mc:Choice xmlns:p14="http://schemas.microsoft.com/office/powerpoint/2010/main" Requires="p14">
+      <p:transition spd="med" p14:dur="700">
+        <p:fade/>
+      </p:transition>
+    </mc:Choice>
+    <mc:Fallback>
+      <p:transition spd="med">
+        <p:fade/>
+      </p:transition>
+    </mc:Fallback>
+  </mc:AlternateContent>
+  <p:timing>
+    <p:tnLst>
+      <p:par>
+        <p:cTn id="1" dur="indefinite" restart="never" nodeType="tmRoot">
+          <p:childTnLst>
+            <p:seq concurrent="1" nextAc="seek">
+              <p:cTn id="2" dur="indefinite" nodeType="mainSeq">
+                <p:childTnLst>
+                  <p:par>
+                    <p:cTn id="3" fill="hold">
+                      <p:stCondLst>
+                        <p:cond delay="indefinite"/>
+                      </p:stCondLst>
+                      <p:childTnLst>
+                        <p:par>
+                          <p:cTn id="4" fill="hold">
+                            <p:stCondLst>
+                              <p:cond delay="0"/>
+                            </p:stCondLst>
+                            <p:childTnLst>
+                              <p:par>
+                                <p:cTn id="5" presetID="1" presetClass="exit" presetSubtype="0" fill="hold" nodeType="clickEffect">
+                                  <p:stCondLst>
+                                    <p:cond delay="0"/>
+                                  </p:stCondLst>
+                                  <p:childTnLst>
+                                    <p:set>
+                                      <p:cBhvr>
+                                        <p:cTn id="6" dur="1" fill="hold">
+                                          <p:stCondLst>
+                                            <p:cond delay="0"/>
+                                          </p:stCondLst>
+                                        </p:cTn>
+                                        <p:tgtEl>
+                                          <p:spTgt spid="5"/>
+                                        </p:tgtEl>
+                                        <p:attrNameLst>
+                                          <p:attrName>style.visibility</p:attrName>
+                                        </p:attrNameLst>
+                                      </p:cBhvr>
+                                      <p:to>
+                                        <p:strVal val="hidden"/>
+                                      </p:to>
+                                    </p:set>
+                                  </p:childTnLst>
+                                </p:cTn>
+                              </p:par>
+                              <p:par>
+                                <p:cTn id="7" presetID="1" presetClass="entr" presetSubtype="0" fill="hold" nodeType="withEffect">
+                                  <p:stCondLst>
+                                    <p:cond delay="0"/>
+                                  </p:stCondLst>
+                                  <p:childTnLst>
+                                    <p:set>
+                                      <p:cBhvr>
+                                        <p:cTn id="8" dur="1" fill="hold">
+                                          <p:stCondLst>
+                                            <p:cond delay="0"/>
+                                          </p:stCondLst>
+                                        </p:cTn>
+                                        <p:tgtEl>
+                                          <p:spTgt spid="3"/>
+                                        </p:tgtEl>
+                                        <p:attrNameLst>
+                                          <p:attrName>style.visibility</p:attrName>
+                                        </p:attrNameLst>
+                                      </p:cBhvr>
+                                      <p:to>
+                                        <p:strVal val="visible"/>
+                                      </p:to>
+                                    </p:set>
+                                  </p:childTnLst>
+                                </p:cTn>
+                              </p:par>
+                            </p:childTnLst>
+                          </p:cTn>
+                        </p:par>
+                      </p:childTnLst>
+                    </p:cTn>
+                  </p:par>
+                </p:childTnLst>
+              </p:cTn>
+              <p:prevCondLst>
+                <p:cond evt="onPrev" delay="0">
+                  <p:tgtEl>
+                    <p:sldTgt/>
+                  </p:tgtEl>
+                </p:cond>
+              </p:prevCondLst>
+              <p:nextCondLst>
+                <p:cond evt="onNext" delay="0">
+                  <p:tgtEl>
+                    <p:sldTgt/>
+                  </p:tgtEl>
+                </p:cond>
+              </p:nextCondLst>
+            </p:seq>
+          </p:childTnLst>
+        </p:cTn>
+      </p:par>
+    </p:tnLst>
+  </p:timing>
+</p:sld>
+</file>
+
+<file path=ppt/slides/slide6.xml><?xml version="1.0" encoding="utf-8"?>
 <p:sld xmlns:a="http://schemas.openxmlformats.org/drawingml/2006/main" xmlns:r="http://schemas.openxmlformats.org/officeDocument/2006/relationships" xmlns:p="http://schemas.openxmlformats.org/presentationml/2006/main">
   <p:cSld>
     <p:spTree>
@@ -5141,11 +6019,11 @@
   <p:clrMapOvr>
     <a:masterClrMapping/>
   </p:clrMapOvr>
-  <mc:AlternateContent xmlns:mc="http://schemas.openxmlformats.org/markup-compatibility/2006">
-    <mc:Choice xmlns:p14="http://schemas.microsoft.com/office/powerpoint/2010/main" Requires="p14">
+  <mc:AlternateContent xmlns:mc="http://schemas.openxmlformats.org/markup-compatibility/2006" xmlns:p14="http://schemas.microsoft.com/office/powerpoint/2010/main">
+    <mc:Choice Requires="p14">
       <p:transition p14:dur="10"/>
     </mc:Choice>
-    <mc:Fallback>
+    <mc:Fallback xmlns="">
       <p:transition/>
     </mc:Fallback>
   </mc:AlternateContent>
@@ -5159,7 +6037,7 @@
 </p:sld>
 </file>
 
-<file path=ppt/slides/slide3.xml><?xml version="1.0" encoding="utf-8"?>
+<file path=ppt/slides/slide7.xml><?xml version="1.0" encoding="utf-8"?>
 <p:sld xmlns:a="http://schemas.openxmlformats.org/drawingml/2006/main" xmlns:r="http://schemas.openxmlformats.org/officeDocument/2006/relationships" xmlns:p="http://schemas.openxmlformats.org/presentationml/2006/main">
   <p:cSld>
     <p:spTree>
@@ -5327,13 +6205,13 @@
   <p:clrMapOvr>
     <a:masterClrMapping/>
   </p:clrMapOvr>
-  <mc:AlternateContent xmlns:mc="http://schemas.openxmlformats.org/markup-compatibility/2006">
-    <mc:Choice xmlns:p14="http://schemas.microsoft.com/office/powerpoint/2010/main" Requires="p14">
+  <mc:AlternateContent xmlns:mc="http://schemas.openxmlformats.org/markup-compatibility/2006" xmlns:p14="http://schemas.microsoft.com/office/powerpoint/2010/main">
+    <mc:Choice Requires="p14">
       <p:transition spd="med" p14:dur="700">
         <p:fade/>
       </p:transition>
     </mc:Choice>
-    <mc:Fallback>
+    <mc:Fallback xmlns="">
       <p:transition spd="med">
         <p:fade/>
       </p:transition>
@@ -5452,7 +6330,7 @@
 </p:sld>
 </file>
 
-<file path=ppt/slides/slide4.xml><?xml version="1.0" encoding="utf-8"?>
+<file path=ppt/slides/slide8.xml><?xml version="1.0" encoding="utf-8"?>
 <p:sld xmlns:a="http://schemas.openxmlformats.org/drawingml/2006/main" xmlns:r="http://schemas.openxmlformats.org/officeDocument/2006/relationships" xmlns:p="http://schemas.openxmlformats.org/presentationml/2006/main">
   <p:cSld>
     <p:spTree>
@@ -5481,16 +6359,818 @@
         </p:nvSpPr>
         <p:spPr/>
         <p:txBody>
+          <a:bodyPr/>
+          <a:lstStyle/>
+          <a:p>
+            <a:r>
+              <a:rPr lang="fr-FR" dirty="0" smtClean="0"/>
+              <a:t>Amélioration d’</a:t>
+            </a:r>
+            <a:r>
+              <a:rPr lang="fr-FR" dirty="0" err="1" smtClean="0"/>
+              <a:t>ADTool</a:t>
+            </a:r>
+            <a:endParaRPr lang="fr-FR" dirty="0"/>
+          </a:p>
+        </p:txBody>
+      </p:sp>
+      <p:pic>
+        <p:nvPicPr>
+          <p:cNvPr id="5" name="Espace réservé du contenu 4"/>
+          <p:cNvPicPr>
+            <a:picLocks noGrp="1" noChangeAspect="1"/>
+          </p:cNvPicPr>
+          <p:nvPr>
+            <p:ph idx="1"/>
+          </p:nvPr>
+        </p:nvPicPr>
+        <p:blipFill>
+          <a:blip r:embed="rId2" cstate="print">
+            <a:extLst>
+              <a:ext uri="{28A0092B-C50C-407E-A947-70E740481C1C}">
+                <a14:useLocalDpi xmlns:a14="http://schemas.microsoft.com/office/drawing/2010/main" val="0"/>
+              </a:ext>
+            </a:extLst>
+          </a:blip>
+          <a:stretch>
+            <a:fillRect/>
+          </a:stretch>
+        </p:blipFill>
+        <p:spPr>
+          <a:xfrm>
+            <a:off x="395536" y="1618335"/>
+            <a:ext cx="2500550" cy="2861206"/>
+          </a:xfrm>
+        </p:spPr>
+      </p:pic>
+      <p:sp>
+        <p:nvSpPr>
+          <p:cNvPr id="4" name="Espace réservé du texte 3"/>
+          <p:cNvSpPr>
+            <a:spLocks noGrp="1"/>
+          </p:cNvSpPr>
+          <p:nvPr>
+            <p:ph type="body" sz="quarter" idx="10"/>
+          </p:nvPr>
+        </p:nvSpPr>
+        <p:spPr/>
+        <p:txBody>
           <a:bodyPr>
-            <a:normAutofit/>
+            <a:normAutofit fontScale="92500" lnSpcReduction="20000"/>
           </a:bodyPr>
           <a:lstStyle/>
           <a:p>
             <a:r>
               <a:rPr lang="fr-FR" dirty="0" smtClean="0"/>
-              <a:t>Paramètre de synthèse</a:t>
+              <a:t>Spécification fonctionnelles</a:t>
             </a:r>
             <a:endParaRPr lang="fr-FR" dirty="0"/>
+          </a:p>
+        </p:txBody>
+      </p:sp>
+      <p:sp>
+        <p:nvSpPr>
+          <p:cNvPr id="6" name="ZoneTexte 5"/>
+          <p:cNvSpPr txBox="1"/>
+          <p:nvPr/>
+        </p:nvSpPr>
+        <p:spPr>
+          <a:xfrm>
+            <a:off x="3491880" y="1525444"/>
+            <a:ext cx="2232248" cy="3046988"/>
+          </a:xfrm>
+          <a:prstGeom prst="rect">
+            <a:avLst/>
+          </a:prstGeom>
+          <a:noFill/>
+        </p:spPr>
+        <p:txBody>
+          <a:bodyPr wrap="square" rtlCol="0">
+            <a:spAutoFit/>
+          </a:bodyPr>
+          <a:lstStyle/>
+          <a:p>
+            <a:r>
+              <a:rPr lang="nl-NL" sz="2400" dirty="0"/>
+              <a:t>op(</a:t>
+            </a:r>
+          </a:p>
+          <a:p>
+            <a:r>
+              <a:rPr lang="nl-NL" sz="2400" dirty="0"/>
+              <a:t>      </a:t>
+            </a:r>
+            <a:r>
+              <a:rPr lang="nl-NL" sz="2400" dirty="0" err="1"/>
+              <a:t>ap</a:t>
+            </a:r>
+            <a:r>
+              <a:rPr lang="nl-NL" sz="2400" dirty="0"/>
+              <a:t>(</a:t>
+            </a:r>
+          </a:p>
+          <a:p>
+            <a:r>
+              <a:rPr lang="nl-NL" sz="2400" dirty="0"/>
+              <a:t>            2.0,</a:t>
+            </a:r>
+          </a:p>
+          <a:p>
+            <a:r>
+              <a:rPr lang="nl-NL" sz="2400" dirty="0"/>
+              <a:t>            2.1</a:t>
+            </a:r>
+          </a:p>
+          <a:p>
+            <a:r>
+              <a:rPr lang="nl-NL" sz="2400" dirty="0"/>
+              <a:t>      ),</a:t>
+            </a:r>
+          </a:p>
+          <a:p>
+            <a:r>
+              <a:rPr lang="nl-NL" sz="2400" dirty="0"/>
+              <a:t>      1.1,</a:t>
+            </a:r>
+          </a:p>
+          <a:p>
+            <a:r>
+              <a:rPr lang="nl-NL" sz="2400" dirty="0"/>
+              <a:t>      1.2</a:t>
+            </a:r>
+          </a:p>
+          <a:p>
+            <a:r>
+              <a:rPr lang="nl-NL" sz="2400" dirty="0"/>
+              <a:t>)</a:t>
+            </a:r>
+            <a:endParaRPr lang="fr-FR" sz="2400" dirty="0"/>
+          </a:p>
+        </p:txBody>
+      </p:sp>
+      <p:sp>
+        <p:nvSpPr>
+          <p:cNvPr id="7" name="ZoneTexte 6"/>
+          <p:cNvSpPr txBox="1"/>
+          <p:nvPr/>
+        </p:nvSpPr>
+        <p:spPr>
+          <a:xfrm>
+            <a:off x="395536" y="5013176"/>
+            <a:ext cx="2644566" cy="369332"/>
+          </a:xfrm>
+          <a:prstGeom prst="rect">
+            <a:avLst/>
+          </a:prstGeom>
+          <a:noFill/>
+        </p:spPr>
+        <p:txBody>
+          <a:bodyPr wrap="square" rtlCol="0">
+            <a:spAutoFit/>
+            <a:scene3d>
+              <a:camera prst="orthographicFront"/>
+              <a:lightRig rig="harsh" dir="t"/>
+            </a:scene3d>
+            <a:sp3d extrusionH="57150" prstMaterial="matte">
+              <a:bevelT w="63500" h="12700" prst="angle"/>
+              <a:contourClr>
+                <a:schemeClr val="bg1">
+                  <a:lumMod val="65000"/>
+                </a:schemeClr>
+              </a:contourClr>
+            </a:sp3d>
+          </a:bodyPr>
+          <a:lstStyle/>
+          <a:p>
+            <a:pPr algn="ctr"/>
+            <a:r>
+              <a:rPr lang="fr-FR" b="1" dirty="0" smtClean="0">
+                <a:ln/>
+                <a:solidFill>
+                  <a:schemeClr val="accent3"/>
+                </a:solidFill>
+              </a:rPr>
+              <a:t>Un arbre</a:t>
+            </a:r>
+            <a:endParaRPr lang="fr-FR" b="1" dirty="0">
+              <a:ln/>
+              <a:solidFill>
+                <a:schemeClr val="accent3"/>
+              </a:solidFill>
+            </a:endParaRPr>
+          </a:p>
+        </p:txBody>
+      </p:sp>
+      <p:sp>
+        <p:nvSpPr>
+          <p:cNvPr id="8" name="ZoneTexte 7"/>
+          <p:cNvSpPr txBox="1"/>
+          <p:nvPr/>
+        </p:nvSpPr>
+        <p:spPr>
+          <a:xfrm>
+            <a:off x="3031966" y="5013176"/>
+            <a:ext cx="2644566" cy="369332"/>
+          </a:xfrm>
+          <a:prstGeom prst="rect">
+            <a:avLst/>
+          </a:prstGeom>
+          <a:noFill/>
+        </p:spPr>
+        <p:txBody>
+          <a:bodyPr wrap="square" rtlCol="0">
+            <a:spAutoFit/>
+            <a:scene3d>
+              <a:camera prst="orthographicFront"/>
+              <a:lightRig rig="harsh" dir="t"/>
+            </a:scene3d>
+            <a:sp3d extrusionH="57150" prstMaterial="matte">
+              <a:bevelT w="63500" h="12700" prst="angle"/>
+              <a:contourClr>
+                <a:schemeClr val="bg1">
+                  <a:lumMod val="65000"/>
+                </a:schemeClr>
+              </a:contourClr>
+            </a:sp3d>
+          </a:bodyPr>
+          <a:lstStyle/>
+          <a:p>
+            <a:pPr algn="ctr"/>
+            <a:r>
+              <a:rPr lang="fr-FR" b="1" dirty="0" smtClean="0">
+                <a:ln/>
+                <a:solidFill>
+                  <a:schemeClr val="accent3"/>
+                </a:solidFill>
+              </a:rPr>
+              <a:t>Une grammaire</a:t>
+            </a:r>
+            <a:endParaRPr lang="fr-FR" b="1" dirty="0">
+              <a:ln/>
+              <a:solidFill>
+                <a:schemeClr val="accent3"/>
+              </a:solidFill>
+            </a:endParaRPr>
+          </a:p>
+        </p:txBody>
+      </p:sp>
+      <p:sp>
+        <p:nvSpPr>
+          <p:cNvPr id="10" name="ZoneTexte 9"/>
+          <p:cNvSpPr txBox="1"/>
+          <p:nvPr/>
+        </p:nvSpPr>
+        <p:spPr>
+          <a:xfrm>
+            <a:off x="6171098" y="1450111"/>
+            <a:ext cx="2232248" cy="3046988"/>
+          </a:xfrm>
+          <a:prstGeom prst="rect">
+            <a:avLst/>
+          </a:prstGeom>
+          <a:noFill/>
+        </p:spPr>
+        <p:txBody>
+          <a:bodyPr wrap="square" rtlCol="0">
+            <a:spAutoFit/>
+          </a:bodyPr>
+          <a:lstStyle/>
+          <a:p>
+            <a:r>
+              <a:rPr lang="nl-NL" sz="2400" dirty="0"/>
+              <a:t>o</a:t>
+            </a:r>
+            <a:r>
+              <a:rPr lang="nl-NL" sz="2400" dirty="0" smtClean="0"/>
+              <a:t>p{0.0}(</a:t>
+            </a:r>
+            <a:endParaRPr lang="nl-NL" sz="2400" dirty="0"/>
+          </a:p>
+          <a:p>
+            <a:r>
+              <a:rPr lang="nl-NL" sz="2400" dirty="0"/>
+              <a:t>      </a:t>
+            </a:r>
+            <a:r>
+              <a:rPr lang="nl-NL" sz="2400" dirty="0" err="1" smtClean="0"/>
+              <a:t>ap</a:t>
+            </a:r>
+            <a:r>
+              <a:rPr lang="nl-NL" sz="2400" dirty="0" smtClean="0"/>
+              <a:t>{1.0}(</a:t>
+            </a:r>
+            <a:endParaRPr lang="nl-NL" sz="2400" dirty="0"/>
+          </a:p>
+          <a:p>
+            <a:r>
+              <a:rPr lang="nl-NL" sz="2400" dirty="0"/>
+              <a:t>            2.0,</a:t>
+            </a:r>
+          </a:p>
+          <a:p>
+            <a:r>
+              <a:rPr lang="nl-NL" sz="2400" dirty="0"/>
+              <a:t>            2.1</a:t>
+            </a:r>
+          </a:p>
+          <a:p>
+            <a:r>
+              <a:rPr lang="nl-NL" sz="2400" dirty="0"/>
+              <a:t>      ),</a:t>
+            </a:r>
+          </a:p>
+          <a:p>
+            <a:r>
+              <a:rPr lang="nl-NL" sz="2400" dirty="0"/>
+              <a:t>      1.1,</a:t>
+            </a:r>
+          </a:p>
+          <a:p>
+            <a:r>
+              <a:rPr lang="nl-NL" sz="2400" dirty="0"/>
+              <a:t>      1.2</a:t>
+            </a:r>
+          </a:p>
+          <a:p>
+            <a:r>
+              <a:rPr lang="nl-NL" sz="2400" dirty="0"/>
+              <a:t>)</a:t>
+            </a:r>
+            <a:endParaRPr lang="fr-FR" sz="2400" dirty="0"/>
+          </a:p>
+        </p:txBody>
+      </p:sp>
+      <p:sp>
+        <p:nvSpPr>
+          <p:cNvPr id="11" name="ZoneTexte 10"/>
+          <p:cNvSpPr txBox="1"/>
+          <p:nvPr/>
+        </p:nvSpPr>
+        <p:spPr>
+          <a:xfrm>
+            <a:off x="5815866" y="4869160"/>
+            <a:ext cx="2644566" cy="646331"/>
+          </a:xfrm>
+          <a:prstGeom prst="rect">
+            <a:avLst/>
+          </a:prstGeom>
+          <a:noFill/>
+        </p:spPr>
+        <p:txBody>
+          <a:bodyPr wrap="square" rtlCol="0">
+            <a:spAutoFit/>
+            <a:scene3d>
+              <a:camera prst="orthographicFront"/>
+              <a:lightRig rig="harsh" dir="t"/>
+            </a:scene3d>
+            <a:sp3d extrusionH="57150" prstMaterial="matte">
+              <a:bevelT w="63500" h="12700" prst="angle"/>
+              <a:contourClr>
+                <a:schemeClr val="bg1">
+                  <a:lumMod val="65000"/>
+                </a:schemeClr>
+              </a:contourClr>
+            </a:sp3d>
+          </a:bodyPr>
+          <a:lstStyle/>
+          <a:p>
+            <a:pPr algn="ctr"/>
+            <a:r>
+              <a:rPr lang="fr-FR" b="1" dirty="0" smtClean="0">
+                <a:ln/>
+                <a:solidFill>
+                  <a:schemeClr val="accent3"/>
+                </a:solidFill>
+              </a:rPr>
+              <a:t>Une nouvelle</a:t>
+            </a:r>
+          </a:p>
+          <a:p>
+            <a:pPr algn="ctr"/>
+            <a:r>
+              <a:rPr lang="fr-FR" b="1" dirty="0" smtClean="0">
+                <a:ln/>
+                <a:solidFill>
+                  <a:schemeClr val="accent3"/>
+                </a:solidFill>
+              </a:rPr>
+              <a:t>grammaire</a:t>
+            </a:r>
+            <a:endParaRPr lang="fr-FR" b="1" dirty="0">
+              <a:ln/>
+              <a:solidFill>
+                <a:schemeClr val="accent3"/>
+              </a:solidFill>
+            </a:endParaRPr>
+          </a:p>
+        </p:txBody>
+      </p:sp>
+    </p:spTree>
+    <p:extLst>
+      <p:ext uri="{BB962C8B-B14F-4D97-AF65-F5344CB8AC3E}">
+        <p14:creationId xmlns:p14="http://schemas.microsoft.com/office/powerpoint/2010/main" val="3707253623"/>
+      </p:ext>
+    </p:extLst>
+  </p:cSld>
+  <p:clrMapOvr>
+    <a:masterClrMapping/>
+  </p:clrMapOvr>
+  <p:timing>
+    <p:tnLst>
+      <p:par>
+        <p:cTn id="1" dur="indefinite" restart="never" nodeType="tmRoot">
+          <p:childTnLst>
+            <p:seq concurrent="1" nextAc="seek">
+              <p:cTn id="2" dur="indefinite" nodeType="mainSeq">
+                <p:childTnLst>
+                  <p:par>
+                    <p:cTn id="3" fill="hold">
+                      <p:stCondLst>
+                        <p:cond delay="indefinite"/>
+                      </p:stCondLst>
+                      <p:childTnLst>
+                        <p:par>
+                          <p:cTn id="4" fill="hold">
+                            <p:stCondLst>
+                              <p:cond delay="0"/>
+                            </p:stCondLst>
+                            <p:childTnLst>
+                              <p:par>
+                                <p:cTn id="5" presetID="10" presetClass="entr" presetSubtype="0" fill="hold" nodeType="clickEffect">
+                                  <p:stCondLst>
+                                    <p:cond delay="0"/>
+                                  </p:stCondLst>
+                                  <p:childTnLst>
+                                    <p:set>
+                                      <p:cBhvr>
+                                        <p:cTn id="6" dur="1" fill="hold">
+                                          <p:stCondLst>
+                                            <p:cond delay="0"/>
+                                          </p:stCondLst>
+                                        </p:cTn>
+                                        <p:tgtEl>
+                                          <p:spTgt spid="5"/>
+                                        </p:tgtEl>
+                                        <p:attrNameLst>
+                                          <p:attrName>style.visibility</p:attrName>
+                                        </p:attrNameLst>
+                                      </p:cBhvr>
+                                      <p:to>
+                                        <p:strVal val="visible"/>
+                                      </p:to>
+                                    </p:set>
+                                    <p:animEffect transition="in" filter="fade">
+                                      <p:cBhvr>
+                                        <p:cTn id="7" dur="500"/>
+                                        <p:tgtEl>
+                                          <p:spTgt spid="5"/>
+                                        </p:tgtEl>
+                                      </p:cBhvr>
+                                    </p:animEffect>
+                                  </p:childTnLst>
+                                </p:cTn>
+                              </p:par>
+                              <p:par>
+                                <p:cTn id="8" presetID="10" presetClass="entr" presetSubtype="0" fill="hold" grpId="0" nodeType="withEffect">
+                                  <p:stCondLst>
+                                    <p:cond delay="0"/>
+                                  </p:stCondLst>
+                                  <p:childTnLst>
+                                    <p:set>
+                                      <p:cBhvr>
+                                        <p:cTn id="9" dur="1" fill="hold">
+                                          <p:stCondLst>
+                                            <p:cond delay="0"/>
+                                          </p:stCondLst>
+                                        </p:cTn>
+                                        <p:tgtEl>
+                                          <p:spTgt spid="7"/>
+                                        </p:tgtEl>
+                                        <p:attrNameLst>
+                                          <p:attrName>style.visibility</p:attrName>
+                                        </p:attrNameLst>
+                                      </p:cBhvr>
+                                      <p:to>
+                                        <p:strVal val="visible"/>
+                                      </p:to>
+                                    </p:set>
+                                    <p:animEffect transition="in" filter="fade">
+                                      <p:cBhvr>
+                                        <p:cTn id="10" dur="500"/>
+                                        <p:tgtEl>
+                                          <p:spTgt spid="7"/>
+                                        </p:tgtEl>
+                                      </p:cBhvr>
+                                    </p:animEffect>
+                                  </p:childTnLst>
+                                </p:cTn>
+                              </p:par>
+                            </p:childTnLst>
+                          </p:cTn>
+                        </p:par>
+                      </p:childTnLst>
+                    </p:cTn>
+                  </p:par>
+                  <p:par>
+                    <p:cTn id="11" fill="hold">
+                      <p:stCondLst>
+                        <p:cond delay="indefinite"/>
+                      </p:stCondLst>
+                      <p:childTnLst>
+                        <p:par>
+                          <p:cTn id="12" fill="hold">
+                            <p:stCondLst>
+                              <p:cond delay="0"/>
+                            </p:stCondLst>
+                            <p:childTnLst>
+                              <p:par>
+                                <p:cTn id="13" presetID="10" presetClass="entr" presetSubtype="0" fill="hold" grpId="0" nodeType="clickEffect">
+                                  <p:stCondLst>
+                                    <p:cond delay="0"/>
+                                  </p:stCondLst>
+                                  <p:childTnLst>
+                                    <p:set>
+                                      <p:cBhvr>
+                                        <p:cTn id="14" dur="1" fill="hold">
+                                          <p:stCondLst>
+                                            <p:cond delay="0"/>
+                                          </p:stCondLst>
+                                        </p:cTn>
+                                        <p:tgtEl>
+                                          <p:spTgt spid="6"/>
+                                        </p:tgtEl>
+                                        <p:attrNameLst>
+                                          <p:attrName>style.visibility</p:attrName>
+                                        </p:attrNameLst>
+                                      </p:cBhvr>
+                                      <p:to>
+                                        <p:strVal val="visible"/>
+                                      </p:to>
+                                    </p:set>
+                                    <p:animEffect transition="in" filter="fade">
+                                      <p:cBhvr>
+                                        <p:cTn id="15" dur="500"/>
+                                        <p:tgtEl>
+                                          <p:spTgt spid="6"/>
+                                        </p:tgtEl>
+                                      </p:cBhvr>
+                                    </p:animEffect>
+                                  </p:childTnLst>
+                                </p:cTn>
+                              </p:par>
+                              <p:par>
+                                <p:cTn id="16" presetID="10" presetClass="entr" presetSubtype="0" fill="hold" grpId="0" nodeType="withEffect">
+                                  <p:stCondLst>
+                                    <p:cond delay="0"/>
+                                  </p:stCondLst>
+                                  <p:childTnLst>
+                                    <p:set>
+                                      <p:cBhvr>
+                                        <p:cTn id="17" dur="1" fill="hold">
+                                          <p:stCondLst>
+                                            <p:cond delay="0"/>
+                                          </p:stCondLst>
+                                        </p:cTn>
+                                        <p:tgtEl>
+                                          <p:spTgt spid="8"/>
+                                        </p:tgtEl>
+                                        <p:attrNameLst>
+                                          <p:attrName>style.visibility</p:attrName>
+                                        </p:attrNameLst>
+                                      </p:cBhvr>
+                                      <p:to>
+                                        <p:strVal val="visible"/>
+                                      </p:to>
+                                    </p:set>
+                                    <p:animEffect transition="in" filter="fade">
+                                      <p:cBhvr>
+                                        <p:cTn id="18" dur="500"/>
+                                        <p:tgtEl>
+                                          <p:spTgt spid="8"/>
+                                        </p:tgtEl>
+                                      </p:cBhvr>
+                                    </p:animEffect>
+                                  </p:childTnLst>
+                                </p:cTn>
+                              </p:par>
+                            </p:childTnLst>
+                          </p:cTn>
+                        </p:par>
+                      </p:childTnLst>
+                    </p:cTn>
+                  </p:par>
+                  <p:par>
+                    <p:cTn id="19" fill="hold">
+                      <p:stCondLst>
+                        <p:cond delay="indefinite"/>
+                      </p:stCondLst>
+                      <p:childTnLst>
+                        <p:par>
+                          <p:cTn id="20" fill="hold">
+                            <p:stCondLst>
+                              <p:cond delay="0"/>
+                            </p:stCondLst>
+                            <p:childTnLst>
+                              <p:par>
+                                <p:cTn id="21" presetID="10" presetClass="entr" presetSubtype="0" fill="hold" grpId="0" nodeType="clickEffect">
+                                  <p:stCondLst>
+                                    <p:cond delay="0"/>
+                                  </p:stCondLst>
+                                  <p:childTnLst>
+                                    <p:set>
+                                      <p:cBhvr>
+                                        <p:cTn id="22" dur="1" fill="hold">
+                                          <p:stCondLst>
+                                            <p:cond delay="0"/>
+                                          </p:stCondLst>
+                                        </p:cTn>
+                                        <p:tgtEl>
+                                          <p:spTgt spid="10"/>
+                                        </p:tgtEl>
+                                        <p:attrNameLst>
+                                          <p:attrName>style.visibility</p:attrName>
+                                        </p:attrNameLst>
+                                      </p:cBhvr>
+                                      <p:to>
+                                        <p:strVal val="visible"/>
+                                      </p:to>
+                                    </p:set>
+                                    <p:animEffect transition="in" filter="fade">
+                                      <p:cBhvr>
+                                        <p:cTn id="23" dur="500"/>
+                                        <p:tgtEl>
+                                          <p:spTgt spid="10"/>
+                                        </p:tgtEl>
+                                      </p:cBhvr>
+                                    </p:animEffect>
+                                  </p:childTnLst>
+                                </p:cTn>
+                              </p:par>
+                              <p:par>
+                                <p:cTn id="24" presetID="10" presetClass="entr" presetSubtype="0" fill="hold" grpId="0" nodeType="withEffect">
+                                  <p:stCondLst>
+                                    <p:cond delay="0"/>
+                                  </p:stCondLst>
+                                  <p:childTnLst>
+                                    <p:set>
+                                      <p:cBhvr>
+                                        <p:cTn id="25" dur="1" fill="hold">
+                                          <p:stCondLst>
+                                            <p:cond delay="0"/>
+                                          </p:stCondLst>
+                                        </p:cTn>
+                                        <p:tgtEl>
+                                          <p:spTgt spid="11"/>
+                                        </p:tgtEl>
+                                        <p:attrNameLst>
+                                          <p:attrName>style.visibility</p:attrName>
+                                        </p:attrNameLst>
+                                      </p:cBhvr>
+                                      <p:to>
+                                        <p:strVal val="visible"/>
+                                      </p:to>
+                                    </p:set>
+                                    <p:animEffect transition="in" filter="fade">
+                                      <p:cBhvr>
+                                        <p:cTn id="26" dur="500"/>
+                                        <p:tgtEl>
+                                          <p:spTgt spid="11"/>
+                                        </p:tgtEl>
+                                      </p:cBhvr>
+                                    </p:animEffect>
+                                  </p:childTnLst>
+                                </p:cTn>
+                              </p:par>
+                            </p:childTnLst>
+                          </p:cTn>
+                        </p:par>
+                      </p:childTnLst>
+                    </p:cTn>
+                  </p:par>
+                </p:childTnLst>
+              </p:cTn>
+              <p:prevCondLst>
+                <p:cond evt="onPrev" delay="0">
+                  <p:tgtEl>
+                    <p:sldTgt/>
+                  </p:tgtEl>
+                </p:cond>
+              </p:prevCondLst>
+              <p:nextCondLst>
+                <p:cond evt="onNext" delay="0">
+                  <p:tgtEl>
+                    <p:sldTgt/>
+                  </p:tgtEl>
+                </p:cond>
+              </p:nextCondLst>
+            </p:seq>
+          </p:childTnLst>
+        </p:cTn>
+      </p:par>
+    </p:tnLst>
+    <p:bldLst>
+      <p:bldP spid="6" grpId="0"/>
+      <p:bldP spid="7" grpId="0"/>
+      <p:bldP spid="8" grpId="0"/>
+      <p:bldP spid="10" grpId="0"/>
+      <p:bldP spid="11" grpId="0"/>
+    </p:bldLst>
+  </p:timing>
+</p:sld>
+</file>
+
+<file path=ppt/slides/slide9.xml><?xml version="1.0" encoding="utf-8"?>
+<p:sld xmlns:a="http://schemas.openxmlformats.org/drawingml/2006/main" xmlns:r="http://schemas.openxmlformats.org/officeDocument/2006/relationships" xmlns:p="http://schemas.openxmlformats.org/presentationml/2006/main">
+  <p:cSld>
+    <p:spTree>
+      <p:nvGrpSpPr>
+        <p:cNvPr id="1" name=""/>
+        <p:cNvGrpSpPr/>
+        <p:nvPr/>
+      </p:nvGrpSpPr>
+      <p:grpSpPr>
+        <a:xfrm>
+          <a:off x="0" y="0"/>
+          <a:ext cx="0" cy="0"/>
+          <a:chOff x="0" y="0"/>
+          <a:chExt cx="0" cy="0"/>
+        </a:xfrm>
+      </p:grpSpPr>
+      <p:sp>
+        <p:nvSpPr>
+          <p:cNvPr id="2" name="Titre 1"/>
+          <p:cNvSpPr>
+            <a:spLocks noGrp="1"/>
+          </p:cNvSpPr>
+          <p:nvPr>
+            <p:ph type="title"/>
+          </p:nvPr>
+        </p:nvSpPr>
+        <p:spPr/>
+        <p:txBody>
+          <a:bodyPr/>
+          <a:lstStyle/>
+          <a:p>
+            <a:r>
+              <a:rPr lang="fr-FR" dirty="0" smtClean="0"/>
+              <a:t>Ergonomie logicielle</a:t>
+            </a:r>
+            <a:endParaRPr lang="fr-FR" dirty="0"/>
+          </a:p>
+        </p:txBody>
+      </p:sp>
+      <p:sp>
+        <p:nvSpPr>
+          <p:cNvPr id="3" name="Espace réservé du contenu 2"/>
+          <p:cNvSpPr>
+            <a:spLocks noGrp="1"/>
+          </p:cNvSpPr>
+          <p:nvPr>
+            <p:ph idx="1"/>
+          </p:nvPr>
+        </p:nvSpPr>
+        <p:spPr>
+          <a:xfrm>
+            <a:off x="671397" y="3590893"/>
+            <a:ext cx="7509131" cy="1296144"/>
+          </a:xfrm>
+        </p:spPr>
+        <p:txBody>
+          <a:bodyPr/>
+          <a:lstStyle/>
+          <a:p>
+            <a:r>
+              <a:rPr lang="fr-FR" dirty="0" smtClean="0"/>
+              <a:t>Des fonctionnalités de base pour améliorer </a:t>
+            </a:r>
+            <a:r>
+              <a:rPr lang="fr-FR" dirty="0" err="1" smtClean="0"/>
+              <a:t>ADTools</a:t>
+            </a:r>
+            <a:r>
+              <a:rPr lang="fr-FR" dirty="0" smtClean="0"/>
+              <a:t>.</a:t>
+            </a:r>
+          </a:p>
+          <a:p>
+            <a:pPr marL="342900" indent="-342900">
+              <a:buFont typeface="Arial" panose="020B0604020202020204" pitchFamily="34" charset="0"/>
+              <a:buChar char="•"/>
+            </a:pPr>
+            <a:r>
+              <a:rPr lang="fr-FR" dirty="0" smtClean="0"/>
+              <a:t>Fonction annuler</a:t>
+            </a:r>
+          </a:p>
+          <a:p>
+            <a:pPr marL="342900" indent="-342900">
+              <a:buFont typeface="Arial" panose="020B0604020202020204" pitchFamily="34" charset="0"/>
+              <a:buChar char="•"/>
+            </a:pPr>
+            <a:r>
+              <a:rPr lang="fr-FR" dirty="0" smtClean="0"/>
+              <a:t>Fonction copier-couper/coller.</a:t>
+            </a:r>
           </a:p>
         </p:txBody>
       </p:sp>
@@ -5511,33 +7191,216 @@
           </a:bodyPr>
           <a:lstStyle/>
           <a:p>
-            <a:endParaRPr lang="fr-FR"/>
+            <a:r>
+              <a:rPr lang="fr-FR" dirty="0"/>
+              <a:t>Spécification fonctionnelles</a:t>
+            </a:r>
+            <a:endParaRPr lang="fr-FR" dirty="0"/>
           </a:p>
         </p:txBody>
       </p:sp>
       <p:sp>
         <p:nvSpPr>
-          <p:cNvPr id="6" name="Espace réservé du contenu 5"/>
-          <p:cNvSpPr>
-            <a:spLocks noGrp="1"/>
+          <p:cNvPr id="6" name="Espace réservé du contenu 2"/>
+          <p:cNvSpPr txBox="1">
+            <a:spLocks/>
           </p:cNvSpPr>
-          <p:nvPr>
-            <p:ph idx="1"/>
-          </p:nvPr>
+          <p:nvPr/>
         </p:nvSpPr>
-        <p:spPr/>
+        <p:spPr>
+          <a:xfrm>
+            <a:off x="671398" y="1880281"/>
+            <a:ext cx="7509131" cy="1296144"/>
+          </a:xfrm>
+          <a:prstGeom prst="rect">
+            <a:avLst/>
+          </a:prstGeom>
+        </p:spPr>
         <p:txBody>
-          <a:bodyPr/>
-          <a:lstStyle/>
-          <a:p>
-            <a:endParaRPr lang="fr-FR"/>
+          <a:bodyPr vert="horz" lIns="91440" tIns="45720" rIns="91440" bIns="45720" rtlCol="0">
+            <a:normAutofit fontScale="92500"/>
+          </a:bodyPr>
+          <a:lstStyle>
+            <a:lvl1pPr marL="0" indent="0" algn="l" defTabSz="914400" rtl="0" eaLnBrk="1" latinLnBrk="0" hangingPunct="1">
+              <a:spcBef>
+                <a:spcPct val="20000"/>
+              </a:spcBef>
+              <a:buFontTx/>
+              <a:buNone/>
+              <a:defRPr lang="fr-FR" sz="2000" b="1" kern="1200">
+                <a:solidFill>
+                  <a:srgbClr val="004D6F"/>
+                </a:solidFill>
+                <a:latin typeface="Arial" pitchFamily="34" charset="0"/>
+                <a:ea typeface="+mn-ea"/>
+                <a:cs typeface="Arial" pitchFamily="34" charset="0"/>
+              </a:defRPr>
+            </a:lvl1pPr>
+            <a:lvl2pPr marL="742950" indent="-285750" algn="l" defTabSz="914400" rtl="0" eaLnBrk="1" latinLnBrk="0" hangingPunct="1">
+              <a:spcBef>
+                <a:spcPct val="20000"/>
+              </a:spcBef>
+              <a:buFont typeface="Arial" panose="020B0604020202020204" pitchFamily="34" charset="0"/>
+              <a:buChar char="•"/>
+              <a:defRPr lang="fr-FR" sz="1500" b="1" kern="1200" baseline="0">
+                <a:solidFill>
+                  <a:srgbClr val="4F4D50"/>
+                </a:solidFill>
+                <a:latin typeface="Arial" pitchFamily="34" charset="0"/>
+                <a:ea typeface="+mn-ea"/>
+                <a:cs typeface="Arial" pitchFamily="34" charset="0"/>
+              </a:defRPr>
+            </a:lvl2pPr>
+            <a:lvl3pPr marL="1143000" indent="-228600" algn="l" defTabSz="914400" rtl="0" eaLnBrk="1" latinLnBrk="0" hangingPunct="1">
+              <a:lnSpc>
+                <a:spcPct val="100000"/>
+              </a:lnSpc>
+              <a:spcBef>
+                <a:spcPts val="600"/>
+              </a:spcBef>
+              <a:buFont typeface="Arial" panose="020B0604020202020204" pitchFamily="34" charset="0"/>
+              <a:buChar char="•"/>
+              <a:defRPr lang="fr-FR" sz="1200" kern="1200" baseline="0" dirty="0" smtClean="0">
+                <a:solidFill>
+                  <a:srgbClr val="4F4D50"/>
+                </a:solidFill>
+                <a:latin typeface="Arial" pitchFamily="34" charset="0"/>
+                <a:ea typeface="+mn-ea"/>
+                <a:cs typeface="Arial" pitchFamily="34" charset="0"/>
+              </a:defRPr>
+            </a:lvl3pPr>
+            <a:lvl4pPr marL="1600200" indent="-228600" algn="l" defTabSz="914400" rtl="0" eaLnBrk="1" latinLnBrk="0" hangingPunct="1">
+              <a:spcBef>
+                <a:spcPct val="20000"/>
+              </a:spcBef>
+              <a:buFont typeface="Arial" panose="020B0604020202020204" pitchFamily="34" charset="0"/>
+              <a:buChar char="–"/>
+              <a:defRPr sz="2000" kern="1200">
+                <a:solidFill>
+                  <a:schemeClr val="tx1"/>
+                </a:solidFill>
+                <a:latin typeface="+mn-lt"/>
+                <a:ea typeface="+mn-ea"/>
+                <a:cs typeface="+mn-cs"/>
+              </a:defRPr>
+            </a:lvl4pPr>
+            <a:lvl5pPr marL="2057400" indent="-228600" algn="l" defTabSz="914400" rtl="0" eaLnBrk="1" latinLnBrk="0" hangingPunct="1">
+              <a:spcBef>
+                <a:spcPct val="20000"/>
+              </a:spcBef>
+              <a:buFont typeface="Arial" panose="020B0604020202020204" pitchFamily="34" charset="0"/>
+              <a:buChar char="»"/>
+              <a:defRPr sz="2000" kern="1200">
+                <a:solidFill>
+                  <a:schemeClr val="tx1"/>
+                </a:solidFill>
+                <a:latin typeface="+mn-lt"/>
+                <a:ea typeface="+mn-ea"/>
+                <a:cs typeface="+mn-cs"/>
+              </a:defRPr>
+            </a:lvl5pPr>
+            <a:lvl6pPr marL="2514600" indent="-228600" algn="l" defTabSz="914400" rtl="0" eaLnBrk="1" latinLnBrk="0" hangingPunct="1">
+              <a:spcBef>
+                <a:spcPct val="20000"/>
+              </a:spcBef>
+              <a:buFont typeface="Arial" panose="020B0604020202020204" pitchFamily="34" charset="0"/>
+              <a:buChar char="•"/>
+              <a:defRPr sz="2000" kern="1200">
+                <a:solidFill>
+                  <a:schemeClr val="tx1"/>
+                </a:solidFill>
+                <a:latin typeface="+mn-lt"/>
+                <a:ea typeface="+mn-ea"/>
+                <a:cs typeface="+mn-cs"/>
+              </a:defRPr>
+            </a:lvl6pPr>
+            <a:lvl7pPr marL="2971800" indent="-228600" algn="l" defTabSz="914400" rtl="0" eaLnBrk="1" latinLnBrk="0" hangingPunct="1">
+              <a:spcBef>
+                <a:spcPct val="20000"/>
+              </a:spcBef>
+              <a:buFont typeface="Arial" panose="020B0604020202020204" pitchFamily="34" charset="0"/>
+              <a:buChar char="•"/>
+              <a:defRPr sz="2000" kern="1200">
+                <a:solidFill>
+                  <a:schemeClr val="tx1"/>
+                </a:solidFill>
+                <a:latin typeface="+mn-lt"/>
+                <a:ea typeface="+mn-ea"/>
+                <a:cs typeface="+mn-cs"/>
+              </a:defRPr>
+            </a:lvl7pPr>
+            <a:lvl8pPr marL="3429000" indent="-228600" algn="l" defTabSz="914400" rtl="0" eaLnBrk="1" latinLnBrk="0" hangingPunct="1">
+              <a:spcBef>
+                <a:spcPct val="20000"/>
+              </a:spcBef>
+              <a:buFont typeface="Arial" panose="020B0604020202020204" pitchFamily="34" charset="0"/>
+              <a:buChar char="•"/>
+              <a:defRPr sz="2000" kern="1200">
+                <a:solidFill>
+                  <a:schemeClr val="tx1"/>
+                </a:solidFill>
+                <a:latin typeface="+mn-lt"/>
+                <a:ea typeface="+mn-ea"/>
+                <a:cs typeface="+mn-cs"/>
+              </a:defRPr>
+            </a:lvl8pPr>
+            <a:lvl9pPr marL="3886200" indent="-228600" algn="l" defTabSz="914400" rtl="0" eaLnBrk="1" latinLnBrk="0" hangingPunct="1">
+              <a:spcBef>
+                <a:spcPct val="20000"/>
+              </a:spcBef>
+              <a:buFont typeface="Arial" panose="020B0604020202020204" pitchFamily="34" charset="0"/>
+              <a:buChar char="•"/>
+              <a:defRPr sz="2000" kern="1200">
+                <a:solidFill>
+                  <a:schemeClr val="tx1"/>
+                </a:solidFill>
+                <a:latin typeface="+mn-lt"/>
+                <a:ea typeface="+mn-ea"/>
+                <a:cs typeface="+mn-cs"/>
+              </a:defRPr>
+            </a:lvl9pPr>
+          </a:lstStyle>
+          <a:p>
+            <a:r>
+              <a:rPr lang="fr-FR" dirty="0" smtClean="0"/>
+              <a:t>Des outils pour gérer son projet de modélisation dans </a:t>
+            </a:r>
+            <a:r>
+              <a:rPr lang="fr-FR" dirty="0" err="1" smtClean="0"/>
+              <a:t>Glasir</a:t>
+            </a:r>
+            <a:r>
+              <a:rPr lang="fr-FR" dirty="0" smtClean="0"/>
+              <a:t>.</a:t>
+            </a:r>
+          </a:p>
+          <a:p>
+            <a:pPr marL="342900" indent="-342900">
+              <a:buFont typeface="Arial" panose="020B0604020202020204" pitchFamily="34" charset="0"/>
+              <a:buChar char="•"/>
+            </a:pPr>
+            <a:r>
+              <a:rPr lang="fr-FR" dirty="0" smtClean="0"/>
+              <a:t>Un affichage des arbres du projet en arborescence</a:t>
+            </a:r>
+          </a:p>
+          <a:p>
+            <a:pPr marL="342900" indent="-342900">
+              <a:buFont typeface="Arial" panose="020B0604020202020204" pitchFamily="34" charset="0"/>
+              <a:buChar char="•"/>
+            </a:pPr>
+            <a:r>
+              <a:rPr lang="fr-FR" dirty="0" smtClean="0"/>
+              <a:t>Une bibliothèque de modèle.</a:t>
+            </a:r>
+            <a:endParaRPr lang="fr-FR" dirty="0" smtClean="0"/>
           </a:p>
         </p:txBody>
       </p:sp>
     </p:spTree>
     <p:extLst>
       <p:ext uri="{BB962C8B-B14F-4D97-AF65-F5344CB8AC3E}">
-        <p14:creationId xmlns:p14="http://schemas.microsoft.com/office/powerpoint/2010/main" val="4013023658"/>
+        <p14:creationId xmlns:p14="http://schemas.microsoft.com/office/powerpoint/2010/main" val="3685594"/>
       </p:ext>
     </p:extLst>
   </p:cSld>

</xml_diff>